<commit_message>
Added git local exercises and update to presentation
</commit_message>
<xml_diff>
--- a/lessons/unb-git-local/WhyVersionControl_JAG_UNB_20140106.pptx
+++ b/lessons/unb-git-local/WhyVersionControl_JAG_UNB_20140106.pptx
@@ -26,6 +26,12 @@
     <p:sldId id="275" r:id="rId20"/>
     <p:sldId id="279" r:id="rId21"/>
     <p:sldId id="280" r:id="rId22"/>
+    <p:sldId id="281" r:id="rId23"/>
+    <p:sldId id="284" r:id="rId24"/>
+    <p:sldId id="285" r:id="rId25"/>
+    <p:sldId id="283" r:id="rId26"/>
+    <p:sldId id="282" r:id="rId27"/>
+    <p:sldId id="286" r:id="rId28"/>
   </p:sldIdLst>
   <p:sldSz cx="9144000" cy="6858000" type="screen4x3"/>
   <p:notesSz cx="6858000" cy="9144000"/>
@@ -308,7 +314,7 @@
           <a:p>
             <a:fld id="{39EE0B07-0869-4DB7-9A82-5AB03AEAE8AD}" type="datetimeFigureOut">
               <a:rPr lang="en-CA" smtClean="0"/>
-              <a:t>29/12/2013</a:t>
+              <a:t>05/01/2014</a:t>
             </a:fld>
             <a:endParaRPr lang="en-CA"/>
           </a:p>
@@ -485,7 +491,7 @@
           <a:p>
             <a:fld id="{39EE0B07-0869-4DB7-9A82-5AB03AEAE8AD}" type="datetimeFigureOut">
               <a:rPr lang="en-CA" smtClean="0"/>
-              <a:t>29/12/2013</a:t>
+              <a:t>05/01/2014</a:t>
             </a:fld>
             <a:endParaRPr lang="en-CA"/>
           </a:p>
@@ -665,7 +671,7 @@
           <a:p>
             <a:fld id="{39EE0B07-0869-4DB7-9A82-5AB03AEAE8AD}" type="datetimeFigureOut">
               <a:rPr lang="en-CA" smtClean="0"/>
-              <a:t>29/12/2013</a:t>
+              <a:t>05/01/2014</a:t>
             </a:fld>
             <a:endParaRPr lang="en-CA"/>
           </a:p>
@@ -835,7 +841,7 @@
           <a:p>
             <a:fld id="{39EE0B07-0869-4DB7-9A82-5AB03AEAE8AD}" type="datetimeFigureOut">
               <a:rPr lang="en-CA" smtClean="0"/>
-              <a:t>29/12/2013</a:t>
+              <a:t>05/01/2014</a:t>
             </a:fld>
             <a:endParaRPr lang="en-CA"/>
           </a:p>
@@ -1081,7 +1087,7 @@
           <a:p>
             <a:fld id="{39EE0B07-0869-4DB7-9A82-5AB03AEAE8AD}" type="datetimeFigureOut">
               <a:rPr lang="en-CA" smtClean="0"/>
-              <a:t>29/12/2013</a:t>
+              <a:t>05/01/2014</a:t>
             </a:fld>
             <a:endParaRPr lang="en-CA"/>
           </a:p>
@@ -1369,7 +1375,7 @@
           <a:p>
             <a:fld id="{39EE0B07-0869-4DB7-9A82-5AB03AEAE8AD}" type="datetimeFigureOut">
               <a:rPr lang="en-CA" smtClean="0"/>
-              <a:t>29/12/2013</a:t>
+              <a:t>05/01/2014</a:t>
             </a:fld>
             <a:endParaRPr lang="en-CA"/>
           </a:p>
@@ -1791,7 +1797,7 @@
           <a:p>
             <a:fld id="{39EE0B07-0869-4DB7-9A82-5AB03AEAE8AD}" type="datetimeFigureOut">
               <a:rPr lang="en-CA" smtClean="0"/>
-              <a:t>29/12/2013</a:t>
+              <a:t>05/01/2014</a:t>
             </a:fld>
             <a:endParaRPr lang="en-CA"/>
           </a:p>
@@ -1909,7 +1915,7 @@
           <a:p>
             <a:fld id="{39EE0B07-0869-4DB7-9A82-5AB03AEAE8AD}" type="datetimeFigureOut">
               <a:rPr lang="en-CA" smtClean="0"/>
-              <a:t>29/12/2013</a:t>
+              <a:t>05/01/2014</a:t>
             </a:fld>
             <a:endParaRPr lang="en-CA"/>
           </a:p>
@@ -2004,7 +2010,7 @@
           <a:p>
             <a:fld id="{39EE0B07-0869-4DB7-9A82-5AB03AEAE8AD}" type="datetimeFigureOut">
               <a:rPr lang="en-CA" smtClean="0"/>
-              <a:t>29/12/2013</a:t>
+              <a:t>05/01/2014</a:t>
             </a:fld>
             <a:endParaRPr lang="en-CA"/>
           </a:p>
@@ -2281,7 +2287,7 @@
           <a:p>
             <a:fld id="{39EE0B07-0869-4DB7-9A82-5AB03AEAE8AD}" type="datetimeFigureOut">
               <a:rPr lang="en-CA" smtClean="0"/>
-              <a:t>29/12/2013</a:t>
+              <a:t>05/01/2014</a:t>
             </a:fld>
             <a:endParaRPr lang="en-CA"/>
           </a:p>
@@ -2538,7 +2544,7 @@
           <a:p>
             <a:fld id="{39EE0B07-0869-4DB7-9A82-5AB03AEAE8AD}" type="datetimeFigureOut">
               <a:rPr lang="en-CA" smtClean="0"/>
-              <a:t>29/12/2013</a:t>
+              <a:t>05/01/2014</a:t>
             </a:fld>
             <a:endParaRPr lang="en-CA"/>
           </a:p>
@@ -2751,7 +2757,7 @@
           <a:p>
             <a:fld id="{39EE0B07-0869-4DB7-9A82-5AB03AEAE8AD}" type="datetimeFigureOut">
               <a:rPr lang="en-CA" smtClean="0"/>
-              <a:t>29/12/2013</a:t>
+              <a:t>05/01/2014</a:t>
             </a:fld>
             <a:endParaRPr lang="en-CA"/>
           </a:p>
@@ -6096,7 +6102,7 @@
               <a:t>What are we going to do with Version Control </a:t>
             </a:r>
             <a:r>
-              <a:rPr lang="en-CA" dirty="0"/>
+              <a:rPr lang="en-CA" dirty="0" smtClean="0"/>
               <a:t>over the next 2 days?</a:t>
             </a:r>
             <a:endParaRPr lang="en-CA" dirty="0"/>
@@ -6122,13 +6128,8 @@
           <a:p>
             <a:r>
               <a:rPr lang="en-CA" dirty="0" smtClean="0"/>
-              <a:t>using git locally (at the command </a:t>
-            </a:r>
-            <a:r>
-              <a:rPr lang="en-CA" dirty="0" smtClean="0"/>
-              <a:t>line): </a:t>
-            </a:r>
-            <a:endParaRPr lang="en-CA" dirty="0" smtClean="0"/>
+              <a:t>using git locally (at the command line): </a:t>
+            </a:r>
           </a:p>
           <a:p>
             <a:pPr lvl="1"/>
@@ -6152,10 +6153,10 @@
             </a:r>
           </a:p>
           <a:p>
-            <a:r>
-              <a:rPr lang="en-CA" dirty="0" smtClean="0"/>
-              <a:t>using git with a remote: </a:t>
-            </a:r>
+            <a:pPr marL="0" indent="0">
+              <a:buNone/>
+            </a:pPr>
+            <a:endParaRPr lang="en-CA" dirty="0" smtClean="0"/>
           </a:p>
           <a:p>
             <a:pPr lvl="1"/>
@@ -6306,11 +6307,7 @@
           <a:p>
             <a:r>
               <a:rPr lang="en-CA" dirty="0" smtClean="0"/>
-              <a:t>What are we going to do with Version Control </a:t>
-            </a:r>
-            <a:r>
-              <a:rPr lang="en-CA" dirty="0" smtClean="0"/>
-              <a:t>over the next 2 days?</a:t>
+              <a:t>What are we going to do with Version Control over the next 2 days?</a:t>
             </a:r>
             <a:endParaRPr lang="en-CA" dirty="0"/>
           </a:p>
@@ -6335,13 +6332,8 @@
           <a:p>
             <a:r>
               <a:rPr lang="en-CA" dirty="0" smtClean="0"/>
-              <a:t>using git locally (at the </a:t>
-            </a:r>
-            <a:r>
-              <a:rPr lang="en-CA" dirty="0" smtClean="0"/>
-              <a:t>command line):</a:t>
-            </a:r>
-            <a:endParaRPr lang="en-CA" dirty="0" smtClean="0"/>
+              <a:t>using git locally (at the command line):</a:t>
+            </a:r>
           </a:p>
           <a:p>
             <a:pPr lvl="1"/>
@@ -6419,6 +6411,2841 @@
     <p:extLst>
       <p:ext uri="{BB962C8B-B14F-4D97-AF65-F5344CB8AC3E}">
         <p14:creationId xmlns:p14="http://schemas.microsoft.com/office/powerpoint/2010/main" val="1241666952"/>
+      </p:ext>
+    </p:extLst>
+  </p:cSld>
+  <p:clrMapOvr>
+    <a:masterClrMapping/>
+  </p:clrMapOvr>
+  <p:timing>
+    <p:tnLst>
+      <p:par>
+        <p:cTn id="1" dur="indefinite" restart="never" nodeType="tmRoot"/>
+      </p:par>
+    </p:tnLst>
+  </p:timing>
+</p:sld>
+</file>
+
+<file path=ppt/slides/slide22.xml><?xml version="1.0" encoding="utf-8"?>
+<p:sld xmlns:a="http://schemas.openxmlformats.org/drawingml/2006/main" xmlns:r="http://schemas.openxmlformats.org/officeDocument/2006/relationships" xmlns:p="http://schemas.openxmlformats.org/presentationml/2006/main">
+  <p:cSld>
+    <p:spTree>
+      <p:nvGrpSpPr>
+        <p:cNvPr id="1" name=""/>
+        <p:cNvGrpSpPr/>
+        <p:nvPr/>
+      </p:nvGrpSpPr>
+      <p:grpSpPr>
+        <a:xfrm>
+          <a:off x="0" y="0"/>
+          <a:ext cx="0" cy="0"/>
+          <a:chOff x="0" y="0"/>
+          <a:chExt cx="0" cy="0"/>
+        </a:xfrm>
+      </p:grpSpPr>
+      <p:sp>
+        <p:nvSpPr>
+          <p:cNvPr id="2" name="Title 1"/>
+          <p:cNvSpPr>
+            <a:spLocks noGrp="1"/>
+          </p:cNvSpPr>
+          <p:nvPr>
+            <p:ph type="title"/>
+          </p:nvPr>
+        </p:nvSpPr>
+        <p:spPr/>
+        <p:txBody>
+          <a:bodyPr/>
+          <a:lstStyle/>
+          <a:p>
+            <a:endParaRPr lang="en-CA"/>
+          </a:p>
+        </p:txBody>
+      </p:sp>
+      <p:sp>
+        <p:nvSpPr>
+          <p:cNvPr id="3" name="Content Placeholder 2"/>
+          <p:cNvSpPr>
+            <a:spLocks noGrp="1"/>
+          </p:cNvSpPr>
+          <p:nvPr>
+            <p:ph idx="1"/>
+          </p:nvPr>
+        </p:nvSpPr>
+        <p:spPr/>
+        <p:txBody>
+          <a:bodyPr/>
+          <a:lstStyle/>
+          <a:p>
+            <a:endParaRPr lang="en-CA"/>
+          </a:p>
+        </p:txBody>
+      </p:sp>
+    </p:spTree>
+    <p:extLst>
+      <p:ext uri="{BB962C8B-B14F-4D97-AF65-F5344CB8AC3E}">
+        <p14:creationId xmlns:p14="http://schemas.microsoft.com/office/powerpoint/2010/main" val="2755427753"/>
+      </p:ext>
+    </p:extLst>
+  </p:cSld>
+  <p:clrMapOvr>
+    <a:masterClrMapping/>
+  </p:clrMapOvr>
+  <p:timing>
+    <p:tnLst>
+      <p:par>
+        <p:cTn id="1" dur="indefinite" restart="never" nodeType="tmRoot"/>
+      </p:par>
+    </p:tnLst>
+  </p:timing>
+</p:sld>
+</file>
+
+<file path=ppt/slides/slide23.xml><?xml version="1.0" encoding="utf-8"?>
+<p:sld xmlns:a="http://schemas.openxmlformats.org/drawingml/2006/main" xmlns:r="http://schemas.openxmlformats.org/officeDocument/2006/relationships" xmlns:p="http://schemas.openxmlformats.org/presentationml/2006/main">
+  <p:cSld>
+    <p:spTree>
+      <p:nvGrpSpPr>
+        <p:cNvPr id="1" name=""/>
+        <p:cNvGrpSpPr/>
+        <p:nvPr/>
+      </p:nvGrpSpPr>
+      <p:grpSpPr>
+        <a:xfrm>
+          <a:off x="0" y="0"/>
+          <a:ext cx="0" cy="0"/>
+          <a:chOff x="0" y="0"/>
+          <a:chExt cx="0" cy="0"/>
+        </a:xfrm>
+      </p:grpSpPr>
+      <p:sp>
+        <p:nvSpPr>
+          <p:cNvPr id="4" name="Title 3"/>
+          <p:cNvSpPr>
+            <a:spLocks noGrp="1"/>
+          </p:cNvSpPr>
+          <p:nvPr>
+            <p:ph type="title"/>
+          </p:nvPr>
+        </p:nvSpPr>
+        <p:spPr/>
+        <p:txBody>
+          <a:bodyPr/>
+          <a:lstStyle/>
+          <a:p>
+            <a:r>
+              <a:rPr lang="en-CA" dirty="0" smtClean="0"/>
+              <a:t>Branching</a:t>
+            </a:r>
+            <a:endParaRPr lang="en-CA" dirty="0"/>
+          </a:p>
+        </p:txBody>
+      </p:sp>
+      <p:sp>
+        <p:nvSpPr>
+          <p:cNvPr id="5" name="Rectangle 4"/>
+          <p:cNvSpPr/>
+          <p:nvPr/>
+        </p:nvSpPr>
+        <p:spPr>
+          <a:xfrm>
+            <a:off x="415577" y="2295818"/>
+            <a:ext cx="936104" cy="1133179"/>
+          </a:xfrm>
+          <a:prstGeom prst="rect">
+            <a:avLst/>
+          </a:prstGeom>
+        </p:spPr>
+        <p:style>
+          <a:lnRef idx="2">
+            <a:schemeClr val="accent1">
+              <a:shade val="50000"/>
+            </a:schemeClr>
+          </a:lnRef>
+          <a:fillRef idx="1">
+            <a:schemeClr val="accent1"/>
+          </a:fillRef>
+          <a:effectRef idx="0">
+            <a:schemeClr val="accent1"/>
+          </a:effectRef>
+          <a:fontRef idx="minor">
+            <a:schemeClr val="lt1"/>
+          </a:fontRef>
+        </p:style>
+        <p:txBody>
+          <a:bodyPr rtlCol="0" anchor="ctr"/>
+          <a:lstStyle/>
+          <a:p>
+            <a:pPr algn="ctr"/>
+            <a:endParaRPr lang="en-CA"/>
+          </a:p>
+        </p:txBody>
+      </p:sp>
+      <p:sp>
+        <p:nvSpPr>
+          <p:cNvPr id="6" name="TextBox 5"/>
+          <p:cNvSpPr txBox="1"/>
+          <p:nvPr/>
+        </p:nvSpPr>
+        <p:spPr>
+          <a:xfrm>
+            <a:off x="217396" y="3587667"/>
+            <a:ext cx="2268570" cy="369332"/>
+          </a:xfrm>
+          <a:prstGeom prst="rect">
+            <a:avLst/>
+          </a:prstGeom>
+          <a:noFill/>
+        </p:spPr>
+        <p:txBody>
+          <a:bodyPr wrap="none" rtlCol="0">
+            <a:spAutoFit/>
+          </a:bodyPr>
+          <a:lstStyle/>
+          <a:p>
+            <a:r>
+              <a:rPr lang="en-CA" dirty="0" smtClean="0"/>
+              <a:t>sorting_by_country.sh</a:t>
+            </a:r>
+            <a:endParaRPr lang="en-CA" dirty="0"/>
+          </a:p>
+        </p:txBody>
+      </p:sp>
+      <p:cxnSp>
+        <p:nvCxnSpPr>
+          <p:cNvPr id="3" name="Straight Arrow Connector 2"/>
+          <p:cNvCxnSpPr/>
+          <p:nvPr/>
+        </p:nvCxnSpPr>
+        <p:spPr>
+          <a:xfrm>
+            <a:off x="1619672" y="2862407"/>
+            <a:ext cx="1080120" cy="0"/>
+          </a:xfrm>
+          <a:prstGeom prst="straightConnector1">
+            <a:avLst/>
+          </a:prstGeom>
+          <a:ln w="25400">
+            <a:tailEnd type="arrow"/>
+          </a:ln>
+        </p:spPr>
+        <p:style>
+          <a:lnRef idx="1">
+            <a:schemeClr val="accent1"/>
+          </a:lnRef>
+          <a:fillRef idx="0">
+            <a:schemeClr val="accent1"/>
+          </a:fillRef>
+          <a:effectRef idx="0">
+            <a:schemeClr val="accent1"/>
+          </a:effectRef>
+          <a:fontRef idx="minor">
+            <a:schemeClr val="tx1"/>
+          </a:fontRef>
+        </p:style>
+      </p:cxnSp>
+      <p:sp>
+        <p:nvSpPr>
+          <p:cNvPr id="8" name="Rectangle 7"/>
+          <p:cNvSpPr/>
+          <p:nvPr/>
+        </p:nvSpPr>
+        <p:spPr>
+          <a:xfrm>
+            <a:off x="2915816" y="2295821"/>
+            <a:ext cx="936104" cy="1133179"/>
+          </a:xfrm>
+          <a:prstGeom prst="rect">
+            <a:avLst/>
+          </a:prstGeom>
+        </p:spPr>
+        <p:style>
+          <a:lnRef idx="2">
+            <a:schemeClr val="accent1">
+              <a:shade val="50000"/>
+            </a:schemeClr>
+          </a:lnRef>
+          <a:fillRef idx="1">
+            <a:schemeClr val="accent1"/>
+          </a:fillRef>
+          <a:effectRef idx="0">
+            <a:schemeClr val="accent1"/>
+          </a:effectRef>
+          <a:fontRef idx="minor">
+            <a:schemeClr val="lt1"/>
+          </a:fontRef>
+        </p:style>
+        <p:txBody>
+          <a:bodyPr rtlCol="0" anchor="ctr"/>
+          <a:lstStyle/>
+          <a:p>
+            <a:pPr algn="ctr"/>
+            <a:endParaRPr lang="en-CA"/>
+          </a:p>
+        </p:txBody>
+      </p:sp>
+      <p:sp>
+        <p:nvSpPr>
+          <p:cNvPr id="9" name="TextBox 8"/>
+          <p:cNvSpPr txBox="1"/>
+          <p:nvPr/>
+        </p:nvSpPr>
+        <p:spPr>
+          <a:xfrm>
+            <a:off x="2915816" y="3580796"/>
+            <a:ext cx="2268570" cy="369332"/>
+          </a:xfrm>
+          <a:prstGeom prst="rect">
+            <a:avLst/>
+          </a:prstGeom>
+          <a:noFill/>
+        </p:spPr>
+        <p:txBody>
+          <a:bodyPr wrap="none" rtlCol="0">
+            <a:spAutoFit/>
+          </a:bodyPr>
+          <a:lstStyle/>
+          <a:p>
+            <a:r>
+              <a:rPr lang="en-CA" dirty="0" smtClean="0"/>
+              <a:t>sorting_by_country.sh</a:t>
+            </a:r>
+            <a:endParaRPr lang="en-CA" dirty="0"/>
+          </a:p>
+        </p:txBody>
+      </p:sp>
+      <p:sp>
+        <p:nvSpPr>
+          <p:cNvPr id="2" name="TextBox 1"/>
+          <p:cNvSpPr txBox="1"/>
+          <p:nvPr/>
+        </p:nvSpPr>
+        <p:spPr>
+          <a:xfrm>
+            <a:off x="7753860" y="2295817"/>
+            <a:ext cx="1080120" cy="646331"/>
+          </a:xfrm>
+          <a:prstGeom prst="rect">
+            <a:avLst/>
+          </a:prstGeom>
+          <a:noFill/>
+          <a:ln>
+            <a:solidFill>
+              <a:schemeClr val="accent1"/>
+            </a:solidFill>
+          </a:ln>
+        </p:spPr>
+        <p:txBody>
+          <a:bodyPr wrap="square" rtlCol="0">
+            <a:spAutoFit/>
+          </a:bodyPr>
+          <a:lstStyle/>
+          <a:p>
+            <a:r>
+              <a:rPr lang="en-CA" dirty="0" smtClean="0"/>
+              <a:t>Master branch</a:t>
+            </a:r>
+            <a:endParaRPr lang="en-CA" dirty="0"/>
+          </a:p>
+        </p:txBody>
+      </p:sp>
+    </p:spTree>
+    <p:extLst>
+      <p:ext uri="{BB962C8B-B14F-4D97-AF65-F5344CB8AC3E}">
+        <p14:creationId xmlns:p14="http://schemas.microsoft.com/office/powerpoint/2010/main" val="1501590642"/>
+      </p:ext>
+    </p:extLst>
+  </p:cSld>
+  <p:clrMapOvr>
+    <a:masterClrMapping/>
+  </p:clrMapOvr>
+  <p:timing>
+    <p:tnLst>
+      <p:par>
+        <p:cTn id="1" dur="indefinite" restart="never" nodeType="tmRoot"/>
+      </p:par>
+    </p:tnLst>
+  </p:timing>
+</p:sld>
+</file>
+
+<file path=ppt/slides/slide24.xml><?xml version="1.0" encoding="utf-8"?>
+<p:sld xmlns:a="http://schemas.openxmlformats.org/drawingml/2006/main" xmlns:r="http://schemas.openxmlformats.org/officeDocument/2006/relationships" xmlns:p="http://schemas.openxmlformats.org/presentationml/2006/main">
+  <p:cSld>
+    <p:spTree>
+      <p:nvGrpSpPr>
+        <p:cNvPr id="1" name=""/>
+        <p:cNvGrpSpPr/>
+        <p:nvPr/>
+      </p:nvGrpSpPr>
+      <p:grpSpPr>
+        <a:xfrm>
+          <a:off x="0" y="0"/>
+          <a:ext cx="0" cy="0"/>
+          <a:chOff x="0" y="0"/>
+          <a:chExt cx="0" cy="0"/>
+        </a:xfrm>
+      </p:grpSpPr>
+      <p:sp>
+        <p:nvSpPr>
+          <p:cNvPr id="4" name="Title 3"/>
+          <p:cNvSpPr>
+            <a:spLocks noGrp="1"/>
+          </p:cNvSpPr>
+          <p:nvPr>
+            <p:ph type="title"/>
+          </p:nvPr>
+        </p:nvSpPr>
+        <p:spPr/>
+        <p:txBody>
+          <a:bodyPr/>
+          <a:lstStyle/>
+          <a:p>
+            <a:r>
+              <a:rPr lang="en-CA" dirty="0" smtClean="0"/>
+              <a:t>Branching</a:t>
+            </a:r>
+            <a:endParaRPr lang="en-CA" dirty="0"/>
+          </a:p>
+        </p:txBody>
+      </p:sp>
+      <p:sp>
+        <p:nvSpPr>
+          <p:cNvPr id="5" name="Rectangle 4"/>
+          <p:cNvSpPr/>
+          <p:nvPr/>
+        </p:nvSpPr>
+        <p:spPr>
+          <a:xfrm>
+            <a:off x="415577" y="2295818"/>
+            <a:ext cx="936104" cy="1133179"/>
+          </a:xfrm>
+          <a:prstGeom prst="rect">
+            <a:avLst/>
+          </a:prstGeom>
+        </p:spPr>
+        <p:style>
+          <a:lnRef idx="2">
+            <a:schemeClr val="accent1">
+              <a:shade val="50000"/>
+            </a:schemeClr>
+          </a:lnRef>
+          <a:fillRef idx="1">
+            <a:schemeClr val="accent1"/>
+          </a:fillRef>
+          <a:effectRef idx="0">
+            <a:schemeClr val="accent1"/>
+          </a:effectRef>
+          <a:fontRef idx="minor">
+            <a:schemeClr val="lt1"/>
+          </a:fontRef>
+        </p:style>
+        <p:txBody>
+          <a:bodyPr rtlCol="0" anchor="ctr"/>
+          <a:lstStyle/>
+          <a:p>
+            <a:pPr algn="ctr"/>
+            <a:endParaRPr lang="en-CA"/>
+          </a:p>
+        </p:txBody>
+      </p:sp>
+      <p:sp>
+        <p:nvSpPr>
+          <p:cNvPr id="6" name="TextBox 5"/>
+          <p:cNvSpPr txBox="1"/>
+          <p:nvPr/>
+        </p:nvSpPr>
+        <p:spPr>
+          <a:xfrm>
+            <a:off x="217396" y="3587667"/>
+            <a:ext cx="2268570" cy="369332"/>
+          </a:xfrm>
+          <a:prstGeom prst="rect">
+            <a:avLst/>
+          </a:prstGeom>
+          <a:noFill/>
+        </p:spPr>
+        <p:txBody>
+          <a:bodyPr wrap="none" rtlCol="0">
+            <a:spAutoFit/>
+          </a:bodyPr>
+          <a:lstStyle/>
+          <a:p>
+            <a:r>
+              <a:rPr lang="en-CA" dirty="0" smtClean="0"/>
+              <a:t>sorting_by_country.sh</a:t>
+            </a:r>
+            <a:endParaRPr lang="en-CA" dirty="0"/>
+          </a:p>
+        </p:txBody>
+      </p:sp>
+      <p:cxnSp>
+        <p:nvCxnSpPr>
+          <p:cNvPr id="3" name="Straight Arrow Connector 2"/>
+          <p:cNvCxnSpPr/>
+          <p:nvPr/>
+        </p:nvCxnSpPr>
+        <p:spPr>
+          <a:xfrm>
+            <a:off x="1619672" y="2862407"/>
+            <a:ext cx="1080120" cy="0"/>
+          </a:xfrm>
+          <a:prstGeom prst="straightConnector1">
+            <a:avLst/>
+          </a:prstGeom>
+          <a:ln w="25400">
+            <a:tailEnd type="arrow"/>
+          </a:ln>
+        </p:spPr>
+        <p:style>
+          <a:lnRef idx="1">
+            <a:schemeClr val="accent1"/>
+          </a:lnRef>
+          <a:fillRef idx="0">
+            <a:schemeClr val="accent1"/>
+          </a:fillRef>
+          <a:effectRef idx="0">
+            <a:schemeClr val="accent1"/>
+          </a:effectRef>
+          <a:fontRef idx="minor">
+            <a:schemeClr val="tx1"/>
+          </a:fontRef>
+        </p:style>
+      </p:cxnSp>
+      <p:sp>
+        <p:nvSpPr>
+          <p:cNvPr id="8" name="Rectangle 7"/>
+          <p:cNvSpPr/>
+          <p:nvPr/>
+        </p:nvSpPr>
+        <p:spPr>
+          <a:xfrm>
+            <a:off x="2915816" y="2295821"/>
+            <a:ext cx="936104" cy="1133179"/>
+          </a:xfrm>
+          <a:prstGeom prst="rect">
+            <a:avLst/>
+          </a:prstGeom>
+        </p:spPr>
+        <p:style>
+          <a:lnRef idx="2">
+            <a:schemeClr val="accent1">
+              <a:shade val="50000"/>
+            </a:schemeClr>
+          </a:lnRef>
+          <a:fillRef idx="1">
+            <a:schemeClr val="accent1"/>
+          </a:fillRef>
+          <a:effectRef idx="0">
+            <a:schemeClr val="accent1"/>
+          </a:effectRef>
+          <a:fontRef idx="minor">
+            <a:schemeClr val="lt1"/>
+          </a:fontRef>
+        </p:style>
+        <p:txBody>
+          <a:bodyPr rtlCol="0" anchor="ctr"/>
+          <a:lstStyle/>
+          <a:p>
+            <a:pPr algn="ctr"/>
+            <a:endParaRPr lang="en-CA"/>
+          </a:p>
+        </p:txBody>
+      </p:sp>
+      <p:sp>
+        <p:nvSpPr>
+          <p:cNvPr id="9" name="TextBox 8"/>
+          <p:cNvSpPr txBox="1"/>
+          <p:nvPr/>
+        </p:nvSpPr>
+        <p:spPr>
+          <a:xfrm>
+            <a:off x="2915816" y="3580796"/>
+            <a:ext cx="2268570" cy="369332"/>
+          </a:xfrm>
+          <a:prstGeom prst="rect">
+            <a:avLst/>
+          </a:prstGeom>
+          <a:noFill/>
+        </p:spPr>
+        <p:txBody>
+          <a:bodyPr wrap="none" rtlCol="0">
+            <a:spAutoFit/>
+          </a:bodyPr>
+          <a:lstStyle/>
+          <a:p>
+            <a:r>
+              <a:rPr lang="en-CA" dirty="0" smtClean="0"/>
+              <a:t>sorting_by_country.sh</a:t>
+            </a:r>
+            <a:endParaRPr lang="en-CA" dirty="0"/>
+          </a:p>
+        </p:txBody>
+      </p:sp>
+      <p:sp>
+        <p:nvSpPr>
+          <p:cNvPr id="2" name="TextBox 1"/>
+          <p:cNvSpPr txBox="1"/>
+          <p:nvPr/>
+        </p:nvSpPr>
+        <p:spPr>
+          <a:xfrm>
+            <a:off x="7753860" y="2295817"/>
+            <a:ext cx="1080120" cy="646331"/>
+          </a:xfrm>
+          <a:prstGeom prst="rect">
+            <a:avLst/>
+          </a:prstGeom>
+          <a:noFill/>
+          <a:ln>
+            <a:solidFill>
+              <a:schemeClr val="accent1"/>
+            </a:solidFill>
+          </a:ln>
+        </p:spPr>
+        <p:txBody>
+          <a:bodyPr wrap="square" rtlCol="0">
+            <a:spAutoFit/>
+          </a:bodyPr>
+          <a:lstStyle/>
+          <a:p>
+            <a:r>
+              <a:rPr lang="en-CA" dirty="0" smtClean="0"/>
+              <a:t>Master branch</a:t>
+            </a:r>
+            <a:endParaRPr lang="en-CA" dirty="0"/>
+          </a:p>
+        </p:txBody>
+      </p:sp>
+      <p:sp>
+        <p:nvSpPr>
+          <p:cNvPr id="13" name="Rectangle 12"/>
+          <p:cNvSpPr/>
+          <p:nvPr/>
+        </p:nvSpPr>
+        <p:spPr>
+          <a:xfrm>
+            <a:off x="3311715" y="4660916"/>
+            <a:ext cx="936104" cy="1133179"/>
+          </a:xfrm>
+          <a:prstGeom prst="rect">
+            <a:avLst/>
+          </a:prstGeom>
+          <a:solidFill>
+            <a:schemeClr val="accent2"/>
+          </a:solidFill>
+          <a:ln>
+            <a:solidFill>
+              <a:schemeClr val="accent2">
+                <a:lumMod val="60000"/>
+                <a:lumOff val="40000"/>
+              </a:schemeClr>
+            </a:solidFill>
+          </a:ln>
+        </p:spPr>
+        <p:style>
+          <a:lnRef idx="2">
+            <a:schemeClr val="accent1">
+              <a:shade val="50000"/>
+            </a:schemeClr>
+          </a:lnRef>
+          <a:fillRef idx="1">
+            <a:schemeClr val="accent1"/>
+          </a:fillRef>
+          <a:effectRef idx="0">
+            <a:schemeClr val="accent1"/>
+          </a:effectRef>
+          <a:fontRef idx="minor">
+            <a:schemeClr val="lt1"/>
+          </a:fontRef>
+        </p:style>
+        <p:txBody>
+          <a:bodyPr rtlCol="0" anchor="ctr"/>
+          <a:lstStyle/>
+          <a:p>
+            <a:pPr algn="ctr"/>
+            <a:endParaRPr lang="en-CA"/>
+          </a:p>
+        </p:txBody>
+      </p:sp>
+      <p:sp>
+        <p:nvSpPr>
+          <p:cNvPr id="14" name="TextBox 13"/>
+          <p:cNvSpPr txBox="1"/>
+          <p:nvPr/>
+        </p:nvSpPr>
+        <p:spPr>
+          <a:xfrm>
+            <a:off x="3311715" y="5945891"/>
+            <a:ext cx="2268570" cy="369332"/>
+          </a:xfrm>
+          <a:prstGeom prst="rect">
+            <a:avLst/>
+          </a:prstGeom>
+          <a:noFill/>
+        </p:spPr>
+        <p:txBody>
+          <a:bodyPr wrap="none" rtlCol="0">
+            <a:spAutoFit/>
+          </a:bodyPr>
+          <a:lstStyle/>
+          <a:p>
+            <a:r>
+              <a:rPr lang="en-CA" dirty="0" smtClean="0"/>
+              <a:t>sorting_by_country.sh</a:t>
+            </a:r>
+            <a:endParaRPr lang="en-CA" dirty="0"/>
+          </a:p>
+        </p:txBody>
+      </p:sp>
+      <p:sp>
+        <p:nvSpPr>
+          <p:cNvPr id="15" name="Rectangle 14"/>
+          <p:cNvSpPr/>
+          <p:nvPr/>
+        </p:nvSpPr>
+        <p:spPr>
+          <a:xfrm>
+            <a:off x="6248642" y="4660912"/>
+            <a:ext cx="936104" cy="1133179"/>
+          </a:xfrm>
+          <a:prstGeom prst="rect">
+            <a:avLst/>
+          </a:prstGeom>
+          <a:solidFill>
+            <a:schemeClr val="accent2"/>
+          </a:solidFill>
+          <a:ln>
+            <a:solidFill>
+              <a:schemeClr val="accent2">
+                <a:lumMod val="60000"/>
+                <a:lumOff val="40000"/>
+              </a:schemeClr>
+            </a:solidFill>
+          </a:ln>
+        </p:spPr>
+        <p:style>
+          <a:lnRef idx="2">
+            <a:schemeClr val="accent1">
+              <a:shade val="50000"/>
+            </a:schemeClr>
+          </a:lnRef>
+          <a:fillRef idx="1">
+            <a:schemeClr val="accent1"/>
+          </a:fillRef>
+          <a:effectRef idx="0">
+            <a:schemeClr val="accent1"/>
+          </a:effectRef>
+          <a:fontRef idx="minor">
+            <a:schemeClr val="lt1"/>
+          </a:fontRef>
+        </p:style>
+        <p:txBody>
+          <a:bodyPr rtlCol="0" anchor="ctr"/>
+          <a:lstStyle/>
+          <a:p>
+            <a:pPr algn="ctr"/>
+            <a:endParaRPr lang="en-CA"/>
+          </a:p>
+        </p:txBody>
+      </p:sp>
+      <p:sp>
+        <p:nvSpPr>
+          <p:cNvPr id="16" name="TextBox 15"/>
+          <p:cNvSpPr txBox="1"/>
+          <p:nvPr/>
+        </p:nvSpPr>
+        <p:spPr>
+          <a:xfrm>
+            <a:off x="6221728" y="5945891"/>
+            <a:ext cx="2268570" cy="369332"/>
+          </a:xfrm>
+          <a:prstGeom prst="rect">
+            <a:avLst/>
+          </a:prstGeom>
+          <a:noFill/>
+        </p:spPr>
+        <p:txBody>
+          <a:bodyPr wrap="none" rtlCol="0">
+            <a:spAutoFit/>
+          </a:bodyPr>
+          <a:lstStyle/>
+          <a:p>
+            <a:r>
+              <a:rPr lang="en-CA" dirty="0" smtClean="0"/>
+              <a:t>sorting_by_country.sh</a:t>
+            </a:r>
+            <a:endParaRPr lang="en-CA" dirty="0"/>
+          </a:p>
+        </p:txBody>
+      </p:sp>
+      <p:cxnSp>
+        <p:nvCxnSpPr>
+          <p:cNvPr id="17" name="Straight Arrow Connector 16"/>
+          <p:cNvCxnSpPr/>
+          <p:nvPr/>
+        </p:nvCxnSpPr>
+        <p:spPr>
+          <a:xfrm>
+            <a:off x="4679622" y="5227502"/>
+            <a:ext cx="1080120" cy="0"/>
+          </a:xfrm>
+          <a:prstGeom prst="straightConnector1">
+            <a:avLst/>
+          </a:prstGeom>
+          <a:ln w="25400">
+            <a:solidFill>
+              <a:schemeClr val="accent2">
+                <a:lumMod val="60000"/>
+                <a:lumOff val="40000"/>
+              </a:schemeClr>
+            </a:solidFill>
+            <a:tailEnd type="arrow"/>
+          </a:ln>
+        </p:spPr>
+        <p:style>
+          <a:lnRef idx="1">
+            <a:schemeClr val="accent1"/>
+          </a:lnRef>
+          <a:fillRef idx="0">
+            <a:schemeClr val="accent1"/>
+          </a:fillRef>
+          <a:effectRef idx="0">
+            <a:schemeClr val="accent1"/>
+          </a:effectRef>
+          <a:fontRef idx="minor">
+            <a:schemeClr val="tx1"/>
+          </a:fontRef>
+        </p:style>
+      </p:cxnSp>
+      <p:cxnSp>
+        <p:nvCxnSpPr>
+          <p:cNvPr id="18" name="Straight Arrow Connector 17"/>
+          <p:cNvCxnSpPr/>
+          <p:nvPr/>
+        </p:nvCxnSpPr>
+        <p:spPr>
+          <a:xfrm>
+            <a:off x="3383868" y="4149080"/>
+            <a:ext cx="468052" cy="288032"/>
+          </a:xfrm>
+          <a:prstGeom prst="straightConnector1">
+            <a:avLst/>
+          </a:prstGeom>
+          <a:ln w="25400">
+            <a:solidFill>
+              <a:schemeClr val="accent2">
+                <a:lumMod val="60000"/>
+                <a:lumOff val="40000"/>
+              </a:schemeClr>
+            </a:solidFill>
+            <a:tailEnd type="arrow"/>
+          </a:ln>
+        </p:spPr>
+        <p:style>
+          <a:lnRef idx="1">
+            <a:schemeClr val="accent1"/>
+          </a:lnRef>
+          <a:fillRef idx="0">
+            <a:schemeClr val="accent1"/>
+          </a:fillRef>
+          <a:effectRef idx="0">
+            <a:schemeClr val="accent1"/>
+          </a:effectRef>
+          <a:fontRef idx="minor">
+            <a:schemeClr val="tx1"/>
+          </a:fontRef>
+        </p:style>
+      </p:cxnSp>
+      <p:sp>
+        <p:nvSpPr>
+          <p:cNvPr id="20" name="TextBox 19"/>
+          <p:cNvSpPr txBox="1"/>
+          <p:nvPr/>
+        </p:nvSpPr>
+        <p:spPr>
+          <a:xfrm>
+            <a:off x="1619672" y="4149080"/>
+            <a:ext cx="1692043" cy="646331"/>
+          </a:xfrm>
+          <a:prstGeom prst="rect">
+            <a:avLst/>
+          </a:prstGeom>
+          <a:noFill/>
+          <a:ln>
+            <a:solidFill>
+              <a:schemeClr val="accent2">
+                <a:lumMod val="60000"/>
+                <a:lumOff val="40000"/>
+              </a:schemeClr>
+            </a:solidFill>
+          </a:ln>
+        </p:spPr>
+        <p:txBody>
+          <a:bodyPr wrap="square" rtlCol="0">
+            <a:spAutoFit/>
+          </a:bodyPr>
+          <a:lstStyle/>
+          <a:p>
+            <a:r>
+              <a:rPr lang="en-CA" dirty="0" smtClean="0"/>
+              <a:t>*Create new branch!</a:t>
+            </a:r>
+            <a:endParaRPr lang="en-CA" dirty="0"/>
+          </a:p>
+        </p:txBody>
+      </p:sp>
+      <p:sp>
+        <p:nvSpPr>
+          <p:cNvPr id="23" name="TextBox 22"/>
+          <p:cNvSpPr txBox="1"/>
+          <p:nvPr/>
+        </p:nvSpPr>
+        <p:spPr>
+          <a:xfrm>
+            <a:off x="7829913" y="4660912"/>
+            <a:ext cx="1134285" cy="646331"/>
+          </a:xfrm>
+          <a:prstGeom prst="rect">
+            <a:avLst/>
+          </a:prstGeom>
+          <a:noFill/>
+          <a:ln>
+            <a:solidFill>
+              <a:schemeClr val="accent2">
+                <a:lumMod val="60000"/>
+                <a:lumOff val="40000"/>
+              </a:schemeClr>
+            </a:solidFill>
+          </a:ln>
+        </p:spPr>
+        <p:txBody>
+          <a:bodyPr wrap="square" rtlCol="0">
+            <a:spAutoFit/>
+          </a:bodyPr>
+          <a:lstStyle/>
+          <a:p>
+            <a:r>
+              <a:rPr lang="en-CA" dirty="0" smtClean="0"/>
+              <a:t>new branch</a:t>
+            </a:r>
+            <a:endParaRPr lang="en-CA" dirty="0"/>
+          </a:p>
+        </p:txBody>
+      </p:sp>
+    </p:spTree>
+    <p:extLst>
+      <p:ext uri="{BB962C8B-B14F-4D97-AF65-F5344CB8AC3E}">
+        <p14:creationId xmlns:p14="http://schemas.microsoft.com/office/powerpoint/2010/main" val="2857118437"/>
+      </p:ext>
+    </p:extLst>
+  </p:cSld>
+  <p:clrMapOvr>
+    <a:masterClrMapping/>
+  </p:clrMapOvr>
+  <p:timing>
+    <p:tnLst>
+      <p:par>
+        <p:cTn id="1" dur="indefinite" restart="never" nodeType="tmRoot"/>
+      </p:par>
+    </p:tnLst>
+  </p:timing>
+</p:sld>
+</file>
+
+<file path=ppt/slides/slide25.xml><?xml version="1.0" encoding="utf-8"?>
+<p:sld xmlns:a="http://schemas.openxmlformats.org/drawingml/2006/main" xmlns:r="http://schemas.openxmlformats.org/officeDocument/2006/relationships" xmlns:p="http://schemas.openxmlformats.org/presentationml/2006/main">
+  <p:cSld>
+    <p:spTree>
+      <p:nvGrpSpPr>
+        <p:cNvPr id="1" name=""/>
+        <p:cNvGrpSpPr/>
+        <p:nvPr/>
+      </p:nvGrpSpPr>
+      <p:grpSpPr>
+        <a:xfrm>
+          <a:off x="0" y="0"/>
+          <a:ext cx="0" cy="0"/>
+          <a:chOff x="0" y="0"/>
+          <a:chExt cx="0" cy="0"/>
+        </a:xfrm>
+      </p:grpSpPr>
+      <p:sp>
+        <p:nvSpPr>
+          <p:cNvPr id="4" name="Title 3"/>
+          <p:cNvSpPr>
+            <a:spLocks noGrp="1"/>
+          </p:cNvSpPr>
+          <p:nvPr>
+            <p:ph type="title"/>
+          </p:nvPr>
+        </p:nvSpPr>
+        <p:spPr/>
+        <p:txBody>
+          <a:bodyPr/>
+          <a:lstStyle/>
+          <a:p>
+            <a:r>
+              <a:rPr lang="en-CA" dirty="0" smtClean="0"/>
+              <a:t>Branching</a:t>
+            </a:r>
+            <a:endParaRPr lang="en-CA" dirty="0"/>
+          </a:p>
+        </p:txBody>
+      </p:sp>
+      <p:sp>
+        <p:nvSpPr>
+          <p:cNvPr id="5" name="Rectangle 4"/>
+          <p:cNvSpPr/>
+          <p:nvPr/>
+        </p:nvSpPr>
+        <p:spPr>
+          <a:xfrm>
+            <a:off x="415577" y="2295818"/>
+            <a:ext cx="936104" cy="1133179"/>
+          </a:xfrm>
+          <a:prstGeom prst="rect">
+            <a:avLst/>
+          </a:prstGeom>
+        </p:spPr>
+        <p:style>
+          <a:lnRef idx="2">
+            <a:schemeClr val="accent1">
+              <a:shade val="50000"/>
+            </a:schemeClr>
+          </a:lnRef>
+          <a:fillRef idx="1">
+            <a:schemeClr val="accent1"/>
+          </a:fillRef>
+          <a:effectRef idx="0">
+            <a:schemeClr val="accent1"/>
+          </a:effectRef>
+          <a:fontRef idx="minor">
+            <a:schemeClr val="lt1"/>
+          </a:fontRef>
+        </p:style>
+        <p:txBody>
+          <a:bodyPr rtlCol="0" anchor="ctr"/>
+          <a:lstStyle/>
+          <a:p>
+            <a:pPr algn="ctr"/>
+            <a:endParaRPr lang="en-CA"/>
+          </a:p>
+        </p:txBody>
+      </p:sp>
+      <p:sp>
+        <p:nvSpPr>
+          <p:cNvPr id="6" name="TextBox 5"/>
+          <p:cNvSpPr txBox="1"/>
+          <p:nvPr/>
+        </p:nvSpPr>
+        <p:spPr>
+          <a:xfrm>
+            <a:off x="217396" y="3587667"/>
+            <a:ext cx="2268570" cy="369332"/>
+          </a:xfrm>
+          <a:prstGeom prst="rect">
+            <a:avLst/>
+          </a:prstGeom>
+          <a:noFill/>
+        </p:spPr>
+        <p:txBody>
+          <a:bodyPr wrap="none" rtlCol="0">
+            <a:spAutoFit/>
+          </a:bodyPr>
+          <a:lstStyle/>
+          <a:p>
+            <a:r>
+              <a:rPr lang="en-CA" dirty="0" smtClean="0"/>
+              <a:t>sorting_by_country.sh</a:t>
+            </a:r>
+            <a:endParaRPr lang="en-CA" dirty="0"/>
+          </a:p>
+        </p:txBody>
+      </p:sp>
+      <p:cxnSp>
+        <p:nvCxnSpPr>
+          <p:cNvPr id="3" name="Straight Arrow Connector 2"/>
+          <p:cNvCxnSpPr/>
+          <p:nvPr/>
+        </p:nvCxnSpPr>
+        <p:spPr>
+          <a:xfrm>
+            <a:off x="1619672" y="2862407"/>
+            <a:ext cx="1080120" cy="0"/>
+          </a:xfrm>
+          <a:prstGeom prst="straightConnector1">
+            <a:avLst/>
+          </a:prstGeom>
+          <a:ln w="25400">
+            <a:tailEnd type="arrow"/>
+          </a:ln>
+        </p:spPr>
+        <p:style>
+          <a:lnRef idx="1">
+            <a:schemeClr val="accent1"/>
+          </a:lnRef>
+          <a:fillRef idx="0">
+            <a:schemeClr val="accent1"/>
+          </a:fillRef>
+          <a:effectRef idx="0">
+            <a:schemeClr val="accent1"/>
+          </a:effectRef>
+          <a:fontRef idx="minor">
+            <a:schemeClr val="tx1"/>
+          </a:fontRef>
+        </p:style>
+      </p:cxnSp>
+      <p:sp>
+        <p:nvSpPr>
+          <p:cNvPr id="8" name="Rectangle 7"/>
+          <p:cNvSpPr/>
+          <p:nvPr/>
+        </p:nvSpPr>
+        <p:spPr>
+          <a:xfrm>
+            <a:off x="2915816" y="2295821"/>
+            <a:ext cx="936104" cy="1133179"/>
+          </a:xfrm>
+          <a:prstGeom prst="rect">
+            <a:avLst/>
+          </a:prstGeom>
+        </p:spPr>
+        <p:style>
+          <a:lnRef idx="2">
+            <a:schemeClr val="accent1">
+              <a:shade val="50000"/>
+            </a:schemeClr>
+          </a:lnRef>
+          <a:fillRef idx="1">
+            <a:schemeClr val="accent1"/>
+          </a:fillRef>
+          <a:effectRef idx="0">
+            <a:schemeClr val="accent1"/>
+          </a:effectRef>
+          <a:fontRef idx="minor">
+            <a:schemeClr val="lt1"/>
+          </a:fontRef>
+        </p:style>
+        <p:txBody>
+          <a:bodyPr rtlCol="0" anchor="ctr"/>
+          <a:lstStyle/>
+          <a:p>
+            <a:pPr algn="ctr"/>
+            <a:endParaRPr lang="en-CA"/>
+          </a:p>
+        </p:txBody>
+      </p:sp>
+      <p:sp>
+        <p:nvSpPr>
+          <p:cNvPr id="9" name="TextBox 8"/>
+          <p:cNvSpPr txBox="1"/>
+          <p:nvPr/>
+        </p:nvSpPr>
+        <p:spPr>
+          <a:xfrm>
+            <a:off x="2915816" y="3580796"/>
+            <a:ext cx="2268570" cy="369332"/>
+          </a:xfrm>
+          <a:prstGeom prst="rect">
+            <a:avLst/>
+          </a:prstGeom>
+          <a:noFill/>
+        </p:spPr>
+        <p:txBody>
+          <a:bodyPr wrap="none" rtlCol="0">
+            <a:spAutoFit/>
+          </a:bodyPr>
+          <a:lstStyle/>
+          <a:p>
+            <a:r>
+              <a:rPr lang="en-CA" dirty="0" smtClean="0"/>
+              <a:t>sorting_by_country.sh</a:t>
+            </a:r>
+            <a:endParaRPr lang="en-CA" dirty="0"/>
+          </a:p>
+        </p:txBody>
+      </p:sp>
+      <p:sp>
+        <p:nvSpPr>
+          <p:cNvPr id="10" name="Rectangle 9"/>
+          <p:cNvSpPr/>
+          <p:nvPr/>
+        </p:nvSpPr>
+        <p:spPr>
+          <a:xfrm>
+            <a:off x="5852743" y="2295817"/>
+            <a:ext cx="936104" cy="1133179"/>
+          </a:xfrm>
+          <a:prstGeom prst="rect">
+            <a:avLst/>
+          </a:prstGeom>
+        </p:spPr>
+        <p:style>
+          <a:lnRef idx="2">
+            <a:schemeClr val="accent1">
+              <a:shade val="50000"/>
+            </a:schemeClr>
+          </a:lnRef>
+          <a:fillRef idx="1">
+            <a:schemeClr val="accent1"/>
+          </a:fillRef>
+          <a:effectRef idx="0">
+            <a:schemeClr val="accent1"/>
+          </a:effectRef>
+          <a:fontRef idx="minor">
+            <a:schemeClr val="lt1"/>
+          </a:fontRef>
+        </p:style>
+        <p:txBody>
+          <a:bodyPr rtlCol="0" anchor="ctr"/>
+          <a:lstStyle/>
+          <a:p>
+            <a:pPr algn="ctr"/>
+            <a:endParaRPr lang="en-CA"/>
+          </a:p>
+        </p:txBody>
+      </p:sp>
+      <p:sp>
+        <p:nvSpPr>
+          <p:cNvPr id="11" name="TextBox 10"/>
+          <p:cNvSpPr txBox="1"/>
+          <p:nvPr/>
+        </p:nvSpPr>
+        <p:spPr>
+          <a:xfrm>
+            <a:off x="5825829" y="3580796"/>
+            <a:ext cx="2268570" cy="369332"/>
+          </a:xfrm>
+          <a:prstGeom prst="rect">
+            <a:avLst/>
+          </a:prstGeom>
+          <a:noFill/>
+        </p:spPr>
+        <p:txBody>
+          <a:bodyPr wrap="none" rtlCol="0">
+            <a:spAutoFit/>
+          </a:bodyPr>
+          <a:lstStyle/>
+          <a:p>
+            <a:r>
+              <a:rPr lang="en-CA" dirty="0" smtClean="0"/>
+              <a:t>sorting_by_country.sh</a:t>
+            </a:r>
+            <a:endParaRPr lang="en-CA" dirty="0"/>
+          </a:p>
+        </p:txBody>
+      </p:sp>
+      <p:cxnSp>
+        <p:nvCxnSpPr>
+          <p:cNvPr id="12" name="Straight Arrow Connector 11"/>
+          <p:cNvCxnSpPr/>
+          <p:nvPr/>
+        </p:nvCxnSpPr>
+        <p:spPr>
+          <a:xfrm>
+            <a:off x="4283723" y="2862407"/>
+            <a:ext cx="1080120" cy="0"/>
+          </a:xfrm>
+          <a:prstGeom prst="straightConnector1">
+            <a:avLst/>
+          </a:prstGeom>
+          <a:ln w="25400">
+            <a:tailEnd type="arrow"/>
+          </a:ln>
+        </p:spPr>
+        <p:style>
+          <a:lnRef idx="1">
+            <a:schemeClr val="accent1"/>
+          </a:lnRef>
+          <a:fillRef idx="0">
+            <a:schemeClr val="accent1"/>
+          </a:fillRef>
+          <a:effectRef idx="0">
+            <a:schemeClr val="accent1"/>
+          </a:effectRef>
+          <a:fontRef idx="minor">
+            <a:schemeClr val="tx1"/>
+          </a:fontRef>
+        </p:style>
+      </p:cxnSp>
+      <p:sp>
+        <p:nvSpPr>
+          <p:cNvPr id="2" name="TextBox 1"/>
+          <p:cNvSpPr txBox="1"/>
+          <p:nvPr/>
+        </p:nvSpPr>
+        <p:spPr>
+          <a:xfrm>
+            <a:off x="7753860" y="2295817"/>
+            <a:ext cx="1080120" cy="646331"/>
+          </a:xfrm>
+          <a:prstGeom prst="rect">
+            <a:avLst/>
+          </a:prstGeom>
+          <a:noFill/>
+          <a:ln>
+            <a:solidFill>
+              <a:schemeClr val="accent1"/>
+            </a:solidFill>
+          </a:ln>
+        </p:spPr>
+        <p:txBody>
+          <a:bodyPr wrap="square" rtlCol="0">
+            <a:spAutoFit/>
+          </a:bodyPr>
+          <a:lstStyle/>
+          <a:p>
+            <a:r>
+              <a:rPr lang="en-CA" dirty="0" smtClean="0"/>
+              <a:t>Master branch</a:t>
+            </a:r>
+            <a:endParaRPr lang="en-CA" dirty="0"/>
+          </a:p>
+        </p:txBody>
+      </p:sp>
+      <p:sp>
+        <p:nvSpPr>
+          <p:cNvPr id="13" name="Rectangle 12"/>
+          <p:cNvSpPr/>
+          <p:nvPr/>
+        </p:nvSpPr>
+        <p:spPr>
+          <a:xfrm>
+            <a:off x="3311715" y="4660916"/>
+            <a:ext cx="936104" cy="1133179"/>
+          </a:xfrm>
+          <a:prstGeom prst="rect">
+            <a:avLst/>
+          </a:prstGeom>
+          <a:solidFill>
+            <a:schemeClr val="accent2"/>
+          </a:solidFill>
+          <a:ln>
+            <a:solidFill>
+              <a:schemeClr val="accent2">
+                <a:lumMod val="60000"/>
+                <a:lumOff val="40000"/>
+              </a:schemeClr>
+            </a:solidFill>
+          </a:ln>
+        </p:spPr>
+        <p:style>
+          <a:lnRef idx="2">
+            <a:schemeClr val="accent1">
+              <a:shade val="50000"/>
+            </a:schemeClr>
+          </a:lnRef>
+          <a:fillRef idx="1">
+            <a:schemeClr val="accent1"/>
+          </a:fillRef>
+          <a:effectRef idx="0">
+            <a:schemeClr val="accent1"/>
+          </a:effectRef>
+          <a:fontRef idx="minor">
+            <a:schemeClr val="lt1"/>
+          </a:fontRef>
+        </p:style>
+        <p:txBody>
+          <a:bodyPr rtlCol="0" anchor="ctr"/>
+          <a:lstStyle/>
+          <a:p>
+            <a:pPr algn="ctr"/>
+            <a:endParaRPr lang="en-CA"/>
+          </a:p>
+        </p:txBody>
+      </p:sp>
+      <p:sp>
+        <p:nvSpPr>
+          <p:cNvPr id="14" name="TextBox 13"/>
+          <p:cNvSpPr txBox="1"/>
+          <p:nvPr/>
+        </p:nvSpPr>
+        <p:spPr>
+          <a:xfrm>
+            <a:off x="3311715" y="5945891"/>
+            <a:ext cx="2268570" cy="369332"/>
+          </a:xfrm>
+          <a:prstGeom prst="rect">
+            <a:avLst/>
+          </a:prstGeom>
+          <a:noFill/>
+        </p:spPr>
+        <p:txBody>
+          <a:bodyPr wrap="none" rtlCol="0">
+            <a:spAutoFit/>
+          </a:bodyPr>
+          <a:lstStyle/>
+          <a:p>
+            <a:r>
+              <a:rPr lang="en-CA" dirty="0" smtClean="0"/>
+              <a:t>sorting_by_country.sh</a:t>
+            </a:r>
+            <a:endParaRPr lang="en-CA" dirty="0"/>
+          </a:p>
+        </p:txBody>
+      </p:sp>
+      <p:sp>
+        <p:nvSpPr>
+          <p:cNvPr id="15" name="Rectangle 14"/>
+          <p:cNvSpPr/>
+          <p:nvPr/>
+        </p:nvSpPr>
+        <p:spPr>
+          <a:xfrm>
+            <a:off x="6248642" y="4660912"/>
+            <a:ext cx="936104" cy="1133179"/>
+          </a:xfrm>
+          <a:prstGeom prst="rect">
+            <a:avLst/>
+          </a:prstGeom>
+          <a:solidFill>
+            <a:schemeClr val="accent2"/>
+          </a:solidFill>
+          <a:ln>
+            <a:solidFill>
+              <a:schemeClr val="accent2">
+                <a:lumMod val="60000"/>
+                <a:lumOff val="40000"/>
+              </a:schemeClr>
+            </a:solidFill>
+          </a:ln>
+        </p:spPr>
+        <p:style>
+          <a:lnRef idx="2">
+            <a:schemeClr val="accent1">
+              <a:shade val="50000"/>
+            </a:schemeClr>
+          </a:lnRef>
+          <a:fillRef idx="1">
+            <a:schemeClr val="accent1"/>
+          </a:fillRef>
+          <a:effectRef idx="0">
+            <a:schemeClr val="accent1"/>
+          </a:effectRef>
+          <a:fontRef idx="minor">
+            <a:schemeClr val="lt1"/>
+          </a:fontRef>
+        </p:style>
+        <p:txBody>
+          <a:bodyPr rtlCol="0" anchor="ctr"/>
+          <a:lstStyle/>
+          <a:p>
+            <a:pPr algn="ctr"/>
+            <a:endParaRPr lang="en-CA"/>
+          </a:p>
+        </p:txBody>
+      </p:sp>
+      <p:sp>
+        <p:nvSpPr>
+          <p:cNvPr id="16" name="TextBox 15"/>
+          <p:cNvSpPr txBox="1"/>
+          <p:nvPr/>
+        </p:nvSpPr>
+        <p:spPr>
+          <a:xfrm>
+            <a:off x="6221728" y="5945891"/>
+            <a:ext cx="2268570" cy="369332"/>
+          </a:xfrm>
+          <a:prstGeom prst="rect">
+            <a:avLst/>
+          </a:prstGeom>
+          <a:noFill/>
+        </p:spPr>
+        <p:txBody>
+          <a:bodyPr wrap="none" rtlCol="0">
+            <a:spAutoFit/>
+          </a:bodyPr>
+          <a:lstStyle/>
+          <a:p>
+            <a:r>
+              <a:rPr lang="en-CA" dirty="0" smtClean="0"/>
+              <a:t>sorting_by_country.sh</a:t>
+            </a:r>
+            <a:endParaRPr lang="en-CA" dirty="0"/>
+          </a:p>
+        </p:txBody>
+      </p:sp>
+      <p:cxnSp>
+        <p:nvCxnSpPr>
+          <p:cNvPr id="17" name="Straight Arrow Connector 16"/>
+          <p:cNvCxnSpPr/>
+          <p:nvPr/>
+        </p:nvCxnSpPr>
+        <p:spPr>
+          <a:xfrm>
+            <a:off x="4679622" y="5227502"/>
+            <a:ext cx="1080120" cy="0"/>
+          </a:xfrm>
+          <a:prstGeom prst="straightConnector1">
+            <a:avLst/>
+          </a:prstGeom>
+          <a:ln w="25400">
+            <a:solidFill>
+              <a:schemeClr val="accent2">
+                <a:lumMod val="60000"/>
+                <a:lumOff val="40000"/>
+              </a:schemeClr>
+            </a:solidFill>
+            <a:tailEnd type="arrow"/>
+          </a:ln>
+        </p:spPr>
+        <p:style>
+          <a:lnRef idx="1">
+            <a:schemeClr val="accent1"/>
+          </a:lnRef>
+          <a:fillRef idx="0">
+            <a:schemeClr val="accent1"/>
+          </a:fillRef>
+          <a:effectRef idx="0">
+            <a:schemeClr val="accent1"/>
+          </a:effectRef>
+          <a:fontRef idx="minor">
+            <a:schemeClr val="tx1"/>
+          </a:fontRef>
+        </p:style>
+      </p:cxnSp>
+      <p:cxnSp>
+        <p:nvCxnSpPr>
+          <p:cNvPr id="18" name="Straight Arrow Connector 17"/>
+          <p:cNvCxnSpPr/>
+          <p:nvPr/>
+        </p:nvCxnSpPr>
+        <p:spPr>
+          <a:xfrm>
+            <a:off x="3383868" y="4149080"/>
+            <a:ext cx="468052" cy="288032"/>
+          </a:xfrm>
+          <a:prstGeom prst="straightConnector1">
+            <a:avLst/>
+          </a:prstGeom>
+          <a:ln w="25400">
+            <a:solidFill>
+              <a:schemeClr val="accent2">
+                <a:lumMod val="60000"/>
+                <a:lumOff val="40000"/>
+              </a:schemeClr>
+            </a:solidFill>
+            <a:tailEnd type="arrow"/>
+          </a:ln>
+        </p:spPr>
+        <p:style>
+          <a:lnRef idx="1">
+            <a:schemeClr val="accent1"/>
+          </a:lnRef>
+          <a:fillRef idx="0">
+            <a:schemeClr val="accent1"/>
+          </a:fillRef>
+          <a:effectRef idx="0">
+            <a:schemeClr val="accent1"/>
+          </a:effectRef>
+          <a:fontRef idx="minor">
+            <a:schemeClr val="tx1"/>
+          </a:fontRef>
+        </p:style>
+      </p:cxnSp>
+      <p:sp>
+        <p:nvSpPr>
+          <p:cNvPr id="23" name="TextBox 22"/>
+          <p:cNvSpPr txBox="1"/>
+          <p:nvPr/>
+        </p:nvSpPr>
+        <p:spPr>
+          <a:xfrm>
+            <a:off x="7829913" y="4660912"/>
+            <a:ext cx="1134285" cy="646331"/>
+          </a:xfrm>
+          <a:prstGeom prst="rect">
+            <a:avLst/>
+          </a:prstGeom>
+          <a:noFill/>
+          <a:ln>
+            <a:solidFill>
+              <a:schemeClr val="accent2">
+                <a:lumMod val="60000"/>
+                <a:lumOff val="40000"/>
+              </a:schemeClr>
+            </a:solidFill>
+          </a:ln>
+        </p:spPr>
+        <p:txBody>
+          <a:bodyPr wrap="square" rtlCol="0">
+            <a:spAutoFit/>
+          </a:bodyPr>
+          <a:lstStyle/>
+          <a:p>
+            <a:r>
+              <a:rPr lang="en-CA" dirty="0" smtClean="0"/>
+              <a:t>new branch</a:t>
+            </a:r>
+            <a:endParaRPr lang="en-CA" dirty="0"/>
+          </a:p>
+        </p:txBody>
+      </p:sp>
+    </p:spTree>
+    <p:extLst>
+      <p:ext uri="{BB962C8B-B14F-4D97-AF65-F5344CB8AC3E}">
+        <p14:creationId xmlns:p14="http://schemas.microsoft.com/office/powerpoint/2010/main" val="496995988"/>
+      </p:ext>
+    </p:extLst>
+  </p:cSld>
+  <p:clrMapOvr>
+    <a:masterClrMapping/>
+  </p:clrMapOvr>
+  <p:timing>
+    <p:tnLst>
+      <p:par>
+        <p:cTn id="1" dur="indefinite" restart="never" nodeType="tmRoot"/>
+      </p:par>
+    </p:tnLst>
+  </p:timing>
+</p:sld>
+</file>
+
+<file path=ppt/slides/slide26.xml><?xml version="1.0" encoding="utf-8"?>
+<p:sld xmlns:a="http://schemas.openxmlformats.org/drawingml/2006/main" xmlns:r="http://schemas.openxmlformats.org/officeDocument/2006/relationships" xmlns:p="http://schemas.openxmlformats.org/presentationml/2006/main">
+  <p:cSld>
+    <p:spTree>
+      <p:nvGrpSpPr>
+        <p:cNvPr id="1" name=""/>
+        <p:cNvGrpSpPr/>
+        <p:nvPr/>
+      </p:nvGrpSpPr>
+      <p:grpSpPr>
+        <a:xfrm>
+          <a:off x="0" y="0"/>
+          <a:ext cx="0" cy="0"/>
+          <a:chOff x="0" y="0"/>
+          <a:chExt cx="0" cy="0"/>
+        </a:xfrm>
+      </p:grpSpPr>
+      <p:sp>
+        <p:nvSpPr>
+          <p:cNvPr id="2" name="Title 1"/>
+          <p:cNvSpPr>
+            <a:spLocks noGrp="1"/>
+          </p:cNvSpPr>
+          <p:nvPr>
+            <p:ph type="title"/>
+          </p:nvPr>
+        </p:nvSpPr>
+        <p:spPr/>
+        <p:txBody>
+          <a:bodyPr>
+            <a:normAutofit fontScale="90000"/>
+          </a:bodyPr>
+          <a:lstStyle/>
+          <a:p>
+            <a:r>
+              <a:rPr lang="en-CA" dirty="0" smtClean="0"/>
+              <a:t>If you branch, eventually you should merge..</a:t>
+            </a:r>
+            <a:endParaRPr lang="en-CA" dirty="0"/>
+          </a:p>
+        </p:txBody>
+      </p:sp>
+      <p:sp>
+        <p:nvSpPr>
+          <p:cNvPr id="4" name="Rectangle 3"/>
+          <p:cNvSpPr/>
+          <p:nvPr/>
+        </p:nvSpPr>
+        <p:spPr>
+          <a:xfrm>
+            <a:off x="395536" y="2052392"/>
+            <a:ext cx="936104" cy="1133179"/>
+          </a:xfrm>
+          <a:prstGeom prst="rect">
+            <a:avLst/>
+          </a:prstGeom>
+        </p:spPr>
+        <p:style>
+          <a:lnRef idx="2">
+            <a:schemeClr val="accent1">
+              <a:shade val="50000"/>
+            </a:schemeClr>
+          </a:lnRef>
+          <a:fillRef idx="1">
+            <a:schemeClr val="accent1"/>
+          </a:fillRef>
+          <a:effectRef idx="0">
+            <a:schemeClr val="accent1"/>
+          </a:effectRef>
+          <a:fontRef idx="minor">
+            <a:schemeClr val="lt1"/>
+          </a:fontRef>
+        </p:style>
+        <p:txBody>
+          <a:bodyPr rtlCol="0" anchor="ctr"/>
+          <a:lstStyle/>
+          <a:p>
+            <a:pPr algn="ctr"/>
+            <a:endParaRPr lang="en-CA"/>
+          </a:p>
+        </p:txBody>
+      </p:sp>
+      <p:sp>
+        <p:nvSpPr>
+          <p:cNvPr id="5" name="TextBox 4"/>
+          <p:cNvSpPr txBox="1"/>
+          <p:nvPr/>
+        </p:nvSpPr>
+        <p:spPr>
+          <a:xfrm>
+            <a:off x="395536" y="3337367"/>
+            <a:ext cx="2268570" cy="369332"/>
+          </a:xfrm>
+          <a:prstGeom prst="rect">
+            <a:avLst/>
+          </a:prstGeom>
+          <a:noFill/>
+        </p:spPr>
+        <p:txBody>
+          <a:bodyPr wrap="none" rtlCol="0">
+            <a:spAutoFit/>
+          </a:bodyPr>
+          <a:lstStyle/>
+          <a:p>
+            <a:r>
+              <a:rPr lang="en-CA" dirty="0" smtClean="0"/>
+              <a:t>sorting_by_country.sh</a:t>
+            </a:r>
+            <a:endParaRPr lang="en-CA" dirty="0"/>
+          </a:p>
+        </p:txBody>
+      </p:sp>
+      <p:sp>
+        <p:nvSpPr>
+          <p:cNvPr id="6" name="Rectangle 5"/>
+          <p:cNvSpPr/>
+          <p:nvPr/>
+        </p:nvSpPr>
+        <p:spPr>
+          <a:xfrm>
+            <a:off x="3332463" y="2052388"/>
+            <a:ext cx="936104" cy="1133179"/>
+          </a:xfrm>
+          <a:prstGeom prst="rect">
+            <a:avLst/>
+          </a:prstGeom>
+        </p:spPr>
+        <p:style>
+          <a:lnRef idx="2">
+            <a:schemeClr val="accent1">
+              <a:shade val="50000"/>
+            </a:schemeClr>
+          </a:lnRef>
+          <a:fillRef idx="1">
+            <a:schemeClr val="accent1"/>
+          </a:fillRef>
+          <a:effectRef idx="0">
+            <a:schemeClr val="accent1"/>
+          </a:effectRef>
+          <a:fontRef idx="minor">
+            <a:schemeClr val="lt1"/>
+          </a:fontRef>
+        </p:style>
+        <p:txBody>
+          <a:bodyPr rtlCol="0" anchor="ctr"/>
+          <a:lstStyle/>
+          <a:p>
+            <a:pPr algn="ctr"/>
+            <a:endParaRPr lang="en-CA"/>
+          </a:p>
+        </p:txBody>
+      </p:sp>
+      <p:sp>
+        <p:nvSpPr>
+          <p:cNvPr id="7" name="TextBox 6"/>
+          <p:cNvSpPr txBox="1"/>
+          <p:nvPr/>
+        </p:nvSpPr>
+        <p:spPr>
+          <a:xfrm>
+            <a:off x="3305549" y="3337367"/>
+            <a:ext cx="2268570" cy="369332"/>
+          </a:xfrm>
+          <a:prstGeom prst="rect">
+            <a:avLst/>
+          </a:prstGeom>
+          <a:noFill/>
+        </p:spPr>
+        <p:txBody>
+          <a:bodyPr wrap="none" rtlCol="0">
+            <a:spAutoFit/>
+          </a:bodyPr>
+          <a:lstStyle/>
+          <a:p>
+            <a:r>
+              <a:rPr lang="en-CA" dirty="0" smtClean="0"/>
+              <a:t>sorting_by_country.sh</a:t>
+            </a:r>
+            <a:endParaRPr lang="en-CA" dirty="0"/>
+          </a:p>
+        </p:txBody>
+      </p:sp>
+      <p:cxnSp>
+        <p:nvCxnSpPr>
+          <p:cNvPr id="8" name="Straight Arrow Connector 7"/>
+          <p:cNvCxnSpPr/>
+          <p:nvPr/>
+        </p:nvCxnSpPr>
+        <p:spPr>
+          <a:xfrm>
+            <a:off x="1763443" y="2618978"/>
+            <a:ext cx="1080120" cy="0"/>
+          </a:xfrm>
+          <a:prstGeom prst="straightConnector1">
+            <a:avLst/>
+          </a:prstGeom>
+          <a:ln w="25400">
+            <a:tailEnd type="arrow"/>
+          </a:ln>
+        </p:spPr>
+        <p:style>
+          <a:lnRef idx="1">
+            <a:schemeClr val="accent1"/>
+          </a:lnRef>
+          <a:fillRef idx="0">
+            <a:schemeClr val="accent1"/>
+          </a:fillRef>
+          <a:effectRef idx="0">
+            <a:schemeClr val="accent1"/>
+          </a:effectRef>
+          <a:fontRef idx="minor">
+            <a:schemeClr val="tx1"/>
+          </a:fontRef>
+        </p:style>
+      </p:cxnSp>
+      <p:sp>
+        <p:nvSpPr>
+          <p:cNvPr id="9" name="TextBox 8"/>
+          <p:cNvSpPr txBox="1"/>
+          <p:nvPr/>
+        </p:nvSpPr>
+        <p:spPr>
+          <a:xfrm>
+            <a:off x="7897952" y="1973560"/>
+            <a:ext cx="1080120" cy="646331"/>
+          </a:xfrm>
+          <a:prstGeom prst="rect">
+            <a:avLst/>
+          </a:prstGeom>
+          <a:noFill/>
+          <a:ln>
+            <a:solidFill>
+              <a:schemeClr val="accent1"/>
+            </a:solidFill>
+          </a:ln>
+        </p:spPr>
+        <p:txBody>
+          <a:bodyPr wrap="square" rtlCol="0">
+            <a:spAutoFit/>
+          </a:bodyPr>
+          <a:lstStyle/>
+          <a:p>
+            <a:r>
+              <a:rPr lang="en-CA" dirty="0" smtClean="0"/>
+              <a:t>Master branch</a:t>
+            </a:r>
+            <a:endParaRPr lang="en-CA" dirty="0"/>
+          </a:p>
+        </p:txBody>
+      </p:sp>
+      <p:sp>
+        <p:nvSpPr>
+          <p:cNvPr id="10" name="Rectangle 9"/>
+          <p:cNvSpPr/>
+          <p:nvPr/>
+        </p:nvSpPr>
+        <p:spPr>
+          <a:xfrm>
+            <a:off x="791435" y="4417487"/>
+            <a:ext cx="936104" cy="1133179"/>
+          </a:xfrm>
+          <a:prstGeom prst="rect">
+            <a:avLst/>
+          </a:prstGeom>
+          <a:solidFill>
+            <a:schemeClr val="accent2"/>
+          </a:solidFill>
+          <a:ln>
+            <a:solidFill>
+              <a:schemeClr val="accent2">
+                <a:lumMod val="60000"/>
+                <a:lumOff val="40000"/>
+              </a:schemeClr>
+            </a:solidFill>
+          </a:ln>
+        </p:spPr>
+        <p:style>
+          <a:lnRef idx="2">
+            <a:schemeClr val="accent1">
+              <a:shade val="50000"/>
+            </a:schemeClr>
+          </a:lnRef>
+          <a:fillRef idx="1">
+            <a:schemeClr val="accent1"/>
+          </a:fillRef>
+          <a:effectRef idx="0">
+            <a:schemeClr val="accent1"/>
+          </a:effectRef>
+          <a:fontRef idx="minor">
+            <a:schemeClr val="lt1"/>
+          </a:fontRef>
+        </p:style>
+        <p:txBody>
+          <a:bodyPr rtlCol="0" anchor="ctr"/>
+          <a:lstStyle/>
+          <a:p>
+            <a:pPr algn="ctr"/>
+            <a:endParaRPr lang="en-CA"/>
+          </a:p>
+        </p:txBody>
+      </p:sp>
+      <p:sp>
+        <p:nvSpPr>
+          <p:cNvPr id="11" name="Rectangle 10"/>
+          <p:cNvSpPr/>
+          <p:nvPr/>
+        </p:nvSpPr>
+        <p:spPr>
+          <a:xfrm>
+            <a:off x="3728362" y="4417483"/>
+            <a:ext cx="936104" cy="1133179"/>
+          </a:xfrm>
+          <a:prstGeom prst="rect">
+            <a:avLst/>
+          </a:prstGeom>
+          <a:solidFill>
+            <a:schemeClr val="accent2"/>
+          </a:solidFill>
+          <a:ln>
+            <a:solidFill>
+              <a:schemeClr val="accent2">
+                <a:lumMod val="60000"/>
+                <a:lumOff val="40000"/>
+              </a:schemeClr>
+            </a:solidFill>
+          </a:ln>
+        </p:spPr>
+        <p:style>
+          <a:lnRef idx="2">
+            <a:schemeClr val="accent1">
+              <a:shade val="50000"/>
+            </a:schemeClr>
+          </a:lnRef>
+          <a:fillRef idx="1">
+            <a:schemeClr val="accent1"/>
+          </a:fillRef>
+          <a:effectRef idx="0">
+            <a:schemeClr val="accent1"/>
+          </a:effectRef>
+          <a:fontRef idx="minor">
+            <a:schemeClr val="lt1"/>
+          </a:fontRef>
+        </p:style>
+        <p:txBody>
+          <a:bodyPr rtlCol="0" anchor="ctr"/>
+          <a:lstStyle/>
+          <a:p>
+            <a:pPr algn="ctr"/>
+            <a:endParaRPr lang="en-CA"/>
+          </a:p>
+        </p:txBody>
+      </p:sp>
+      <p:cxnSp>
+        <p:nvCxnSpPr>
+          <p:cNvPr id="12" name="Straight Arrow Connector 11"/>
+          <p:cNvCxnSpPr/>
+          <p:nvPr/>
+        </p:nvCxnSpPr>
+        <p:spPr>
+          <a:xfrm>
+            <a:off x="2159342" y="4984073"/>
+            <a:ext cx="1080120" cy="0"/>
+          </a:xfrm>
+          <a:prstGeom prst="straightConnector1">
+            <a:avLst/>
+          </a:prstGeom>
+          <a:ln w="25400">
+            <a:solidFill>
+              <a:schemeClr val="accent2">
+                <a:lumMod val="60000"/>
+                <a:lumOff val="40000"/>
+              </a:schemeClr>
+            </a:solidFill>
+            <a:tailEnd type="arrow"/>
+          </a:ln>
+        </p:spPr>
+        <p:style>
+          <a:lnRef idx="1">
+            <a:schemeClr val="accent1"/>
+          </a:lnRef>
+          <a:fillRef idx="0">
+            <a:schemeClr val="accent1"/>
+          </a:fillRef>
+          <a:effectRef idx="0">
+            <a:schemeClr val="accent1"/>
+          </a:effectRef>
+          <a:fontRef idx="minor">
+            <a:schemeClr val="tx1"/>
+          </a:fontRef>
+        </p:style>
+      </p:cxnSp>
+      <p:cxnSp>
+        <p:nvCxnSpPr>
+          <p:cNvPr id="13" name="Straight Arrow Connector 12"/>
+          <p:cNvCxnSpPr/>
+          <p:nvPr/>
+        </p:nvCxnSpPr>
+        <p:spPr>
+          <a:xfrm>
+            <a:off x="863588" y="3905651"/>
+            <a:ext cx="468052" cy="288032"/>
+          </a:xfrm>
+          <a:prstGeom prst="straightConnector1">
+            <a:avLst/>
+          </a:prstGeom>
+          <a:ln w="25400">
+            <a:solidFill>
+              <a:schemeClr val="accent2">
+                <a:lumMod val="60000"/>
+                <a:lumOff val="40000"/>
+              </a:schemeClr>
+            </a:solidFill>
+            <a:tailEnd type="arrow"/>
+          </a:ln>
+        </p:spPr>
+        <p:style>
+          <a:lnRef idx="1">
+            <a:schemeClr val="accent1"/>
+          </a:lnRef>
+          <a:fillRef idx="0">
+            <a:schemeClr val="accent1"/>
+          </a:fillRef>
+          <a:effectRef idx="0">
+            <a:schemeClr val="accent1"/>
+          </a:effectRef>
+          <a:fontRef idx="minor">
+            <a:schemeClr val="tx1"/>
+          </a:fontRef>
+        </p:style>
+      </p:cxnSp>
+      <p:sp>
+        <p:nvSpPr>
+          <p:cNvPr id="14" name="TextBox 13"/>
+          <p:cNvSpPr txBox="1"/>
+          <p:nvPr/>
+        </p:nvSpPr>
+        <p:spPr>
+          <a:xfrm>
+            <a:off x="7843787" y="4660906"/>
+            <a:ext cx="1134285" cy="646331"/>
+          </a:xfrm>
+          <a:prstGeom prst="rect">
+            <a:avLst/>
+          </a:prstGeom>
+          <a:noFill/>
+          <a:ln>
+            <a:solidFill>
+              <a:schemeClr val="accent2">
+                <a:lumMod val="60000"/>
+                <a:lumOff val="40000"/>
+              </a:schemeClr>
+            </a:solidFill>
+          </a:ln>
+        </p:spPr>
+        <p:txBody>
+          <a:bodyPr wrap="square" rtlCol="0">
+            <a:spAutoFit/>
+          </a:bodyPr>
+          <a:lstStyle/>
+          <a:p>
+            <a:r>
+              <a:rPr lang="en-CA" dirty="0" smtClean="0"/>
+              <a:t>new branch</a:t>
+            </a:r>
+            <a:endParaRPr lang="en-CA" dirty="0"/>
+          </a:p>
+        </p:txBody>
+      </p:sp>
+      <p:sp>
+        <p:nvSpPr>
+          <p:cNvPr id="15" name="TextBox 14"/>
+          <p:cNvSpPr txBox="1"/>
+          <p:nvPr/>
+        </p:nvSpPr>
+        <p:spPr>
+          <a:xfrm>
+            <a:off x="197355" y="5779282"/>
+            <a:ext cx="2268570" cy="369332"/>
+          </a:xfrm>
+          <a:prstGeom prst="rect">
+            <a:avLst/>
+          </a:prstGeom>
+          <a:noFill/>
+        </p:spPr>
+        <p:txBody>
+          <a:bodyPr wrap="none" rtlCol="0">
+            <a:spAutoFit/>
+          </a:bodyPr>
+          <a:lstStyle/>
+          <a:p>
+            <a:r>
+              <a:rPr lang="en-CA" dirty="0" smtClean="0"/>
+              <a:t>sorting_by_country.sh</a:t>
+            </a:r>
+            <a:endParaRPr lang="en-CA" dirty="0"/>
+          </a:p>
+        </p:txBody>
+      </p:sp>
+      <p:sp>
+        <p:nvSpPr>
+          <p:cNvPr id="16" name="TextBox 15"/>
+          <p:cNvSpPr txBox="1"/>
+          <p:nvPr/>
+        </p:nvSpPr>
+        <p:spPr>
+          <a:xfrm>
+            <a:off x="3107368" y="5779282"/>
+            <a:ext cx="2268570" cy="369332"/>
+          </a:xfrm>
+          <a:prstGeom prst="rect">
+            <a:avLst/>
+          </a:prstGeom>
+          <a:noFill/>
+        </p:spPr>
+        <p:txBody>
+          <a:bodyPr wrap="none" rtlCol="0">
+            <a:spAutoFit/>
+          </a:bodyPr>
+          <a:lstStyle/>
+          <a:p>
+            <a:r>
+              <a:rPr lang="en-CA" dirty="0" smtClean="0"/>
+              <a:t>sorting_by_country.sh</a:t>
+            </a:r>
+            <a:endParaRPr lang="en-CA" dirty="0"/>
+          </a:p>
+        </p:txBody>
+      </p:sp>
+      <p:cxnSp>
+        <p:nvCxnSpPr>
+          <p:cNvPr id="17" name="Straight Arrow Connector 16"/>
+          <p:cNvCxnSpPr/>
+          <p:nvPr/>
+        </p:nvCxnSpPr>
+        <p:spPr>
+          <a:xfrm flipV="1">
+            <a:off x="4824028" y="3734777"/>
+            <a:ext cx="792088" cy="710788"/>
+          </a:xfrm>
+          <a:prstGeom prst="straightConnector1">
+            <a:avLst/>
+          </a:prstGeom>
+          <a:ln w="25400">
+            <a:solidFill>
+              <a:schemeClr val="accent2">
+                <a:lumMod val="60000"/>
+                <a:lumOff val="40000"/>
+              </a:schemeClr>
+            </a:solidFill>
+            <a:tailEnd type="arrow"/>
+          </a:ln>
+        </p:spPr>
+        <p:style>
+          <a:lnRef idx="1">
+            <a:schemeClr val="accent1"/>
+          </a:lnRef>
+          <a:fillRef idx="0">
+            <a:schemeClr val="accent1"/>
+          </a:fillRef>
+          <a:effectRef idx="0">
+            <a:schemeClr val="accent1"/>
+          </a:effectRef>
+          <a:fontRef idx="minor">
+            <a:schemeClr val="tx1"/>
+          </a:fontRef>
+        </p:style>
+      </p:cxnSp>
+      <p:cxnSp>
+        <p:nvCxnSpPr>
+          <p:cNvPr id="19" name="Straight Arrow Connector 18"/>
+          <p:cNvCxnSpPr/>
+          <p:nvPr/>
+        </p:nvCxnSpPr>
+        <p:spPr>
+          <a:xfrm>
+            <a:off x="4535996" y="2615624"/>
+            <a:ext cx="1080120" cy="0"/>
+          </a:xfrm>
+          <a:prstGeom prst="straightConnector1">
+            <a:avLst/>
+          </a:prstGeom>
+          <a:ln w="25400">
+            <a:tailEnd type="arrow"/>
+          </a:ln>
+        </p:spPr>
+        <p:style>
+          <a:lnRef idx="1">
+            <a:schemeClr val="accent1"/>
+          </a:lnRef>
+          <a:fillRef idx="0">
+            <a:schemeClr val="accent1"/>
+          </a:fillRef>
+          <a:effectRef idx="0">
+            <a:schemeClr val="accent1"/>
+          </a:effectRef>
+          <a:fontRef idx="minor">
+            <a:schemeClr val="tx1"/>
+          </a:fontRef>
+        </p:style>
+      </p:cxnSp>
+      <p:sp>
+        <p:nvSpPr>
+          <p:cNvPr id="20" name="Rectangle 19"/>
+          <p:cNvSpPr/>
+          <p:nvPr/>
+        </p:nvSpPr>
+        <p:spPr>
+          <a:xfrm>
+            <a:off x="6039461" y="2053301"/>
+            <a:ext cx="936104" cy="1133179"/>
+          </a:xfrm>
+          <a:prstGeom prst="rect">
+            <a:avLst/>
+          </a:prstGeom>
+        </p:spPr>
+        <p:style>
+          <a:lnRef idx="2">
+            <a:schemeClr val="accent1">
+              <a:shade val="50000"/>
+            </a:schemeClr>
+          </a:lnRef>
+          <a:fillRef idx="1">
+            <a:schemeClr val="accent1"/>
+          </a:fillRef>
+          <a:effectRef idx="0">
+            <a:schemeClr val="accent1"/>
+          </a:effectRef>
+          <a:fontRef idx="minor">
+            <a:schemeClr val="lt1"/>
+          </a:fontRef>
+        </p:style>
+        <p:txBody>
+          <a:bodyPr rtlCol="0" anchor="ctr"/>
+          <a:lstStyle/>
+          <a:p>
+            <a:pPr algn="ctr"/>
+            <a:endParaRPr lang="en-CA"/>
+          </a:p>
+        </p:txBody>
+      </p:sp>
+      <p:sp>
+        <p:nvSpPr>
+          <p:cNvPr id="21" name="TextBox 20"/>
+          <p:cNvSpPr txBox="1"/>
+          <p:nvPr/>
+        </p:nvSpPr>
+        <p:spPr>
+          <a:xfrm>
+            <a:off x="6073778" y="3365445"/>
+            <a:ext cx="2268570" cy="369332"/>
+          </a:xfrm>
+          <a:prstGeom prst="rect">
+            <a:avLst/>
+          </a:prstGeom>
+          <a:noFill/>
+        </p:spPr>
+        <p:txBody>
+          <a:bodyPr wrap="none" rtlCol="0">
+            <a:spAutoFit/>
+          </a:bodyPr>
+          <a:lstStyle/>
+          <a:p>
+            <a:r>
+              <a:rPr lang="en-CA" dirty="0" smtClean="0"/>
+              <a:t>sorting_by_country.sh</a:t>
+            </a:r>
+            <a:endParaRPr lang="en-CA" dirty="0"/>
+          </a:p>
+        </p:txBody>
+      </p:sp>
+      <p:sp>
+        <p:nvSpPr>
+          <p:cNvPr id="22" name="TextBox 21"/>
+          <p:cNvSpPr txBox="1"/>
+          <p:nvPr/>
+        </p:nvSpPr>
+        <p:spPr>
+          <a:xfrm>
+            <a:off x="5574119" y="3905651"/>
+            <a:ext cx="1134285" cy="1754326"/>
+          </a:xfrm>
+          <a:prstGeom prst="rect">
+            <a:avLst/>
+          </a:prstGeom>
+          <a:noFill/>
+          <a:ln>
+            <a:solidFill>
+              <a:schemeClr val="accent2">
+                <a:lumMod val="60000"/>
+                <a:lumOff val="40000"/>
+              </a:schemeClr>
+            </a:solidFill>
+          </a:ln>
+        </p:spPr>
+        <p:txBody>
+          <a:bodyPr wrap="square" rtlCol="0">
+            <a:spAutoFit/>
+          </a:bodyPr>
+          <a:lstStyle/>
+          <a:p>
+            <a:r>
+              <a:rPr lang="en-CA" dirty="0" smtClean="0"/>
+              <a:t>merge new branch into master branch</a:t>
+            </a:r>
+            <a:endParaRPr lang="en-CA" dirty="0"/>
+          </a:p>
+        </p:txBody>
+      </p:sp>
+    </p:spTree>
+    <p:extLst>
+      <p:ext uri="{BB962C8B-B14F-4D97-AF65-F5344CB8AC3E}">
+        <p14:creationId xmlns:p14="http://schemas.microsoft.com/office/powerpoint/2010/main" val="3509316042"/>
+      </p:ext>
+    </p:extLst>
+  </p:cSld>
+  <p:clrMapOvr>
+    <a:masterClrMapping/>
+  </p:clrMapOvr>
+  <p:timing>
+    <p:tnLst>
+      <p:par>
+        <p:cTn id="1" dur="indefinite" restart="never" nodeType="tmRoot"/>
+      </p:par>
+    </p:tnLst>
+  </p:timing>
+</p:sld>
+</file>
+
+<file path=ppt/slides/slide27.xml><?xml version="1.0" encoding="utf-8"?>
+<p:sld xmlns:a="http://schemas.openxmlformats.org/drawingml/2006/main" xmlns:r="http://schemas.openxmlformats.org/officeDocument/2006/relationships" xmlns:p="http://schemas.openxmlformats.org/presentationml/2006/main">
+  <p:cSld>
+    <p:spTree>
+      <p:nvGrpSpPr>
+        <p:cNvPr id="1" name=""/>
+        <p:cNvGrpSpPr/>
+        <p:nvPr/>
+      </p:nvGrpSpPr>
+      <p:grpSpPr>
+        <a:xfrm>
+          <a:off x="0" y="0"/>
+          <a:ext cx="0" cy="0"/>
+          <a:chOff x="0" y="0"/>
+          <a:chExt cx="0" cy="0"/>
+        </a:xfrm>
+      </p:grpSpPr>
+      <p:sp>
+        <p:nvSpPr>
+          <p:cNvPr id="2" name="Title 1"/>
+          <p:cNvSpPr>
+            <a:spLocks noGrp="1"/>
+          </p:cNvSpPr>
+          <p:nvPr>
+            <p:ph type="title"/>
+          </p:nvPr>
+        </p:nvSpPr>
+        <p:spPr/>
+        <p:txBody>
+          <a:bodyPr>
+            <a:normAutofit/>
+          </a:bodyPr>
+          <a:lstStyle/>
+          <a:p>
+            <a:r>
+              <a:rPr lang="en-CA" dirty="0" smtClean="0"/>
+              <a:t>After the merge</a:t>
+            </a:r>
+            <a:endParaRPr lang="en-CA" dirty="0"/>
+          </a:p>
+        </p:txBody>
+      </p:sp>
+      <p:sp>
+        <p:nvSpPr>
+          <p:cNvPr id="6" name="Rectangle 5"/>
+          <p:cNvSpPr/>
+          <p:nvPr/>
+        </p:nvSpPr>
+        <p:spPr>
+          <a:xfrm>
+            <a:off x="288251" y="1913313"/>
+            <a:ext cx="936104" cy="1133179"/>
+          </a:xfrm>
+          <a:prstGeom prst="rect">
+            <a:avLst/>
+          </a:prstGeom>
+        </p:spPr>
+        <p:style>
+          <a:lnRef idx="2">
+            <a:schemeClr val="accent1">
+              <a:shade val="50000"/>
+            </a:schemeClr>
+          </a:lnRef>
+          <a:fillRef idx="1">
+            <a:schemeClr val="accent1"/>
+          </a:fillRef>
+          <a:effectRef idx="0">
+            <a:schemeClr val="accent1"/>
+          </a:effectRef>
+          <a:fontRef idx="minor">
+            <a:schemeClr val="lt1"/>
+          </a:fontRef>
+        </p:style>
+        <p:txBody>
+          <a:bodyPr rtlCol="0" anchor="ctr"/>
+          <a:lstStyle/>
+          <a:p>
+            <a:pPr algn="ctr"/>
+            <a:endParaRPr lang="en-CA"/>
+          </a:p>
+        </p:txBody>
+      </p:sp>
+      <p:sp>
+        <p:nvSpPr>
+          <p:cNvPr id="7" name="TextBox 6"/>
+          <p:cNvSpPr txBox="1"/>
+          <p:nvPr/>
+        </p:nvSpPr>
+        <p:spPr>
+          <a:xfrm>
+            <a:off x="261337" y="3198292"/>
+            <a:ext cx="2268570" cy="369332"/>
+          </a:xfrm>
+          <a:prstGeom prst="rect">
+            <a:avLst/>
+          </a:prstGeom>
+          <a:noFill/>
+        </p:spPr>
+        <p:txBody>
+          <a:bodyPr wrap="none" rtlCol="0">
+            <a:spAutoFit/>
+          </a:bodyPr>
+          <a:lstStyle/>
+          <a:p>
+            <a:r>
+              <a:rPr lang="en-CA" dirty="0" smtClean="0"/>
+              <a:t>sorting_by_country.sh</a:t>
+            </a:r>
+            <a:endParaRPr lang="en-CA" dirty="0"/>
+          </a:p>
+        </p:txBody>
+      </p:sp>
+      <p:sp>
+        <p:nvSpPr>
+          <p:cNvPr id="9" name="TextBox 8"/>
+          <p:cNvSpPr txBox="1"/>
+          <p:nvPr/>
+        </p:nvSpPr>
+        <p:spPr>
+          <a:xfrm>
+            <a:off x="7897952" y="1973560"/>
+            <a:ext cx="1080120" cy="646331"/>
+          </a:xfrm>
+          <a:prstGeom prst="rect">
+            <a:avLst/>
+          </a:prstGeom>
+          <a:noFill/>
+          <a:ln>
+            <a:solidFill>
+              <a:schemeClr val="accent1"/>
+            </a:solidFill>
+          </a:ln>
+        </p:spPr>
+        <p:txBody>
+          <a:bodyPr wrap="square" rtlCol="0">
+            <a:spAutoFit/>
+          </a:bodyPr>
+          <a:lstStyle/>
+          <a:p>
+            <a:r>
+              <a:rPr lang="en-CA" dirty="0" smtClean="0"/>
+              <a:t>Master branch</a:t>
+            </a:r>
+            <a:endParaRPr lang="en-CA" dirty="0"/>
+          </a:p>
+        </p:txBody>
+      </p:sp>
+      <p:sp>
+        <p:nvSpPr>
+          <p:cNvPr id="11" name="Rectangle 10"/>
+          <p:cNvSpPr/>
+          <p:nvPr/>
+        </p:nvSpPr>
+        <p:spPr>
+          <a:xfrm>
+            <a:off x="684150" y="4278408"/>
+            <a:ext cx="936104" cy="1133179"/>
+          </a:xfrm>
+          <a:prstGeom prst="rect">
+            <a:avLst/>
+          </a:prstGeom>
+          <a:solidFill>
+            <a:schemeClr val="accent2"/>
+          </a:solidFill>
+          <a:ln>
+            <a:solidFill>
+              <a:schemeClr val="accent2">
+                <a:lumMod val="60000"/>
+                <a:lumOff val="40000"/>
+              </a:schemeClr>
+            </a:solidFill>
+          </a:ln>
+        </p:spPr>
+        <p:style>
+          <a:lnRef idx="2">
+            <a:schemeClr val="accent1">
+              <a:shade val="50000"/>
+            </a:schemeClr>
+          </a:lnRef>
+          <a:fillRef idx="1">
+            <a:schemeClr val="accent1"/>
+          </a:fillRef>
+          <a:effectRef idx="0">
+            <a:schemeClr val="accent1"/>
+          </a:effectRef>
+          <a:fontRef idx="minor">
+            <a:schemeClr val="lt1"/>
+          </a:fontRef>
+        </p:style>
+        <p:txBody>
+          <a:bodyPr rtlCol="0" anchor="ctr"/>
+          <a:lstStyle/>
+          <a:p>
+            <a:pPr algn="ctr"/>
+            <a:endParaRPr lang="en-CA"/>
+          </a:p>
+        </p:txBody>
+      </p:sp>
+      <p:sp>
+        <p:nvSpPr>
+          <p:cNvPr id="14" name="TextBox 13"/>
+          <p:cNvSpPr txBox="1"/>
+          <p:nvPr/>
+        </p:nvSpPr>
+        <p:spPr>
+          <a:xfrm>
+            <a:off x="7843787" y="4660906"/>
+            <a:ext cx="1134285" cy="646331"/>
+          </a:xfrm>
+          <a:prstGeom prst="rect">
+            <a:avLst/>
+          </a:prstGeom>
+          <a:noFill/>
+          <a:ln>
+            <a:solidFill>
+              <a:schemeClr val="accent2">
+                <a:lumMod val="60000"/>
+                <a:lumOff val="40000"/>
+              </a:schemeClr>
+            </a:solidFill>
+          </a:ln>
+        </p:spPr>
+        <p:txBody>
+          <a:bodyPr wrap="square" rtlCol="0">
+            <a:spAutoFit/>
+          </a:bodyPr>
+          <a:lstStyle/>
+          <a:p>
+            <a:r>
+              <a:rPr lang="en-CA" dirty="0" smtClean="0"/>
+              <a:t>new branch</a:t>
+            </a:r>
+            <a:endParaRPr lang="en-CA" dirty="0"/>
+          </a:p>
+        </p:txBody>
+      </p:sp>
+      <p:sp>
+        <p:nvSpPr>
+          <p:cNvPr id="16" name="TextBox 15"/>
+          <p:cNvSpPr txBox="1"/>
+          <p:nvPr/>
+        </p:nvSpPr>
+        <p:spPr>
+          <a:xfrm>
+            <a:off x="63156" y="5640207"/>
+            <a:ext cx="2268570" cy="369332"/>
+          </a:xfrm>
+          <a:prstGeom prst="rect">
+            <a:avLst/>
+          </a:prstGeom>
+          <a:noFill/>
+        </p:spPr>
+        <p:txBody>
+          <a:bodyPr wrap="none" rtlCol="0">
+            <a:spAutoFit/>
+          </a:bodyPr>
+          <a:lstStyle/>
+          <a:p>
+            <a:r>
+              <a:rPr lang="en-CA" dirty="0" smtClean="0"/>
+              <a:t>sorting_by_country.sh</a:t>
+            </a:r>
+            <a:endParaRPr lang="en-CA" dirty="0"/>
+          </a:p>
+        </p:txBody>
+      </p:sp>
+      <p:cxnSp>
+        <p:nvCxnSpPr>
+          <p:cNvPr id="17" name="Straight Arrow Connector 16"/>
+          <p:cNvCxnSpPr/>
+          <p:nvPr/>
+        </p:nvCxnSpPr>
+        <p:spPr>
+          <a:xfrm flipV="1">
+            <a:off x="1779816" y="3595702"/>
+            <a:ext cx="792088" cy="710788"/>
+          </a:xfrm>
+          <a:prstGeom prst="straightConnector1">
+            <a:avLst/>
+          </a:prstGeom>
+          <a:ln w="25400">
+            <a:solidFill>
+              <a:schemeClr val="accent2">
+                <a:lumMod val="60000"/>
+                <a:lumOff val="40000"/>
+              </a:schemeClr>
+            </a:solidFill>
+            <a:tailEnd type="arrow"/>
+          </a:ln>
+        </p:spPr>
+        <p:style>
+          <a:lnRef idx="1">
+            <a:schemeClr val="accent1"/>
+          </a:lnRef>
+          <a:fillRef idx="0">
+            <a:schemeClr val="accent1"/>
+          </a:fillRef>
+          <a:effectRef idx="0">
+            <a:schemeClr val="accent1"/>
+          </a:effectRef>
+          <a:fontRef idx="minor">
+            <a:schemeClr val="tx1"/>
+          </a:fontRef>
+        </p:style>
+      </p:cxnSp>
+      <p:cxnSp>
+        <p:nvCxnSpPr>
+          <p:cNvPr id="19" name="Straight Arrow Connector 18"/>
+          <p:cNvCxnSpPr/>
+          <p:nvPr/>
+        </p:nvCxnSpPr>
+        <p:spPr>
+          <a:xfrm>
+            <a:off x="1491784" y="2476549"/>
+            <a:ext cx="1080120" cy="0"/>
+          </a:xfrm>
+          <a:prstGeom prst="straightConnector1">
+            <a:avLst/>
+          </a:prstGeom>
+          <a:ln w="25400">
+            <a:tailEnd type="arrow"/>
+          </a:ln>
+        </p:spPr>
+        <p:style>
+          <a:lnRef idx="1">
+            <a:schemeClr val="accent1"/>
+          </a:lnRef>
+          <a:fillRef idx="0">
+            <a:schemeClr val="accent1"/>
+          </a:fillRef>
+          <a:effectRef idx="0">
+            <a:schemeClr val="accent1"/>
+          </a:effectRef>
+          <a:fontRef idx="minor">
+            <a:schemeClr val="tx1"/>
+          </a:fontRef>
+        </p:style>
+      </p:cxnSp>
+      <p:sp>
+        <p:nvSpPr>
+          <p:cNvPr id="20" name="Rectangle 19"/>
+          <p:cNvSpPr/>
+          <p:nvPr/>
+        </p:nvSpPr>
+        <p:spPr>
+          <a:xfrm>
+            <a:off x="2995249" y="1914226"/>
+            <a:ext cx="936104" cy="1133179"/>
+          </a:xfrm>
+          <a:prstGeom prst="rect">
+            <a:avLst/>
+          </a:prstGeom>
+        </p:spPr>
+        <p:style>
+          <a:lnRef idx="2">
+            <a:schemeClr val="accent1">
+              <a:shade val="50000"/>
+            </a:schemeClr>
+          </a:lnRef>
+          <a:fillRef idx="1">
+            <a:schemeClr val="accent1"/>
+          </a:fillRef>
+          <a:effectRef idx="0">
+            <a:schemeClr val="accent1"/>
+          </a:effectRef>
+          <a:fontRef idx="minor">
+            <a:schemeClr val="lt1"/>
+          </a:fontRef>
+        </p:style>
+        <p:txBody>
+          <a:bodyPr rtlCol="0" anchor="ctr"/>
+          <a:lstStyle/>
+          <a:p>
+            <a:pPr algn="ctr"/>
+            <a:endParaRPr lang="en-CA"/>
+          </a:p>
+        </p:txBody>
+      </p:sp>
+      <p:sp>
+        <p:nvSpPr>
+          <p:cNvPr id="21" name="TextBox 20"/>
+          <p:cNvSpPr txBox="1"/>
+          <p:nvPr/>
+        </p:nvSpPr>
+        <p:spPr>
+          <a:xfrm>
+            <a:off x="3029566" y="3226370"/>
+            <a:ext cx="2268570" cy="369332"/>
+          </a:xfrm>
+          <a:prstGeom prst="rect">
+            <a:avLst/>
+          </a:prstGeom>
+          <a:noFill/>
+        </p:spPr>
+        <p:txBody>
+          <a:bodyPr wrap="none" rtlCol="0">
+            <a:spAutoFit/>
+          </a:bodyPr>
+          <a:lstStyle/>
+          <a:p>
+            <a:r>
+              <a:rPr lang="en-CA" dirty="0" smtClean="0"/>
+              <a:t>sorting_by_country.sh</a:t>
+            </a:r>
+            <a:endParaRPr lang="en-CA" dirty="0"/>
+          </a:p>
+        </p:txBody>
+      </p:sp>
+      <p:sp>
+        <p:nvSpPr>
+          <p:cNvPr id="23" name="Rectangle 22"/>
+          <p:cNvSpPr/>
+          <p:nvPr/>
+        </p:nvSpPr>
+        <p:spPr>
+          <a:xfrm>
+            <a:off x="5940152" y="1973560"/>
+            <a:ext cx="936104" cy="1133179"/>
+          </a:xfrm>
+          <a:prstGeom prst="rect">
+            <a:avLst/>
+          </a:prstGeom>
+        </p:spPr>
+        <p:style>
+          <a:lnRef idx="2">
+            <a:schemeClr val="accent1">
+              <a:shade val="50000"/>
+            </a:schemeClr>
+          </a:lnRef>
+          <a:fillRef idx="1">
+            <a:schemeClr val="accent1"/>
+          </a:fillRef>
+          <a:effectRef idx="0">
+            <a:schemeClr val="accent1"/>
+          </a:effectRef>
+          <a:fontRef idx="minor">
+            <a:schemeClr val="lt1"/>
+          </a:fontRef>
+        </p:style>
+        <p:txBody>
+          <a:bodyPr rtlCol="0" anchor="ctr"/>
+          <a:lstStyle/>
+          <a:p>
+            <a:pPr algn="ctr"/>
+            <a:endParaRPr lang="en-CA"/>
+          </a:p>
+        </p:txBody>
+      </p:sp>
+      <p:cxnSp>
+        <p:nvCxnSpPr>
+          <p:cNvPr id="24" name="Straight Arrow Connector 23"/>
+          <p:cNvCxnSpPr/>
+          <p:nvPr/>
+        </p:nvCxnSpPr>
+        <p:spPr>
+          <a:xfrm>
+            <a:off x="4355976" y="2540149"/>
+            <a:ext cx="1080120" cy="0"/>
+          </a:xfrm>
+          <a:prstGeom prst="straightConnector1">
+            <a:avLst/>
+          </a:prstGeom>
+          <a:ln w="25400">
+            <a:tailEnd type="arrow"/>
+          </a:ln>
+        </p:spPr>
+        <p:style>
+          <a:lnRef idx="1">
+            <a:schemeClr val="accent1"/>
+          </a:lnRef>
+          <a:fillRef idx="0">
+            <a:schemeClr val="accent1"/>
+          </a:fillRef>
+          <a:effectRef idx="0">
+            <a:schemeClr val="accent1"/>
+          </a:effectRef>
+          <a:fontRef idx="minor">
+            <a:schemeClr val="tx1"/>
+          </a:fontRef>
+        </p:style>
+      </p:cxnSp>
+      <p:sp>
+        <p:nvSpPr>
+          <p:cNvPr id="25" name="TextBox 24"/>
+          <p:cNvSpPr txBox="1"/>
+          <p:nvPr/>
+        </p:nvSpPr>
+        <p:spPr>
+          <a:xfrm>
+            <a:off x="5940152" y="3247085"/>
+            <a:ext cx="2268570" cy="369332"/>
+          </a:xfrm>
+          <a:prstGeom prst="rect">
+            <a:avLst/>
+          </a:prstGeom>
+          <a:noFill/>
+        </p:spPr>
+        <p:txBody>
+          <a:bodyPr wrap="none" rtlCol="0">
+            <a:spAutoFit/>
+          </a:bodyPr>
+          <a:lstStyle/>
+          <a:p>
+            <a:r>
+              <a:rPr lang="en-CA" dirty="0" smtClean="0"/>
+              <a:t>sorting_by_country.sh</a:t>
+            </a:r>
+            <a:endParaRPr lang="en-CA" dirty="0"/>
+          </a:p>
+        </p:txBody>
+      </p:sp>
+    </p:spTree>
+    <p:extLst>
+      <p:ext uri="{BB962C8B-B14F-4D97-AF65-F5344CB8AC3E}">
+        <p14:creationId xmlns:p14="http://schemas.microsoft.com/office/powerpoint/2010/main" val="1419255299"/>
       </p:ext>
     </p:extLst>
   </p:cSld>

</xml_diff>